<commit_message>
Dodanie kilka rozdziałów do prezentacji
</commit_message>
<xml_diff>
--- a/accommodation_announcements_presentation.pptx
+++ b/accommodation_announcements_presentation.pptx
@@ -8,6 +8,13 @@
     <p:sldId id="256" r:id="rId2"/>
     <p:sldId id="257" r:id="rId3"/>
     <p:sldId id="258" r:id="rId4"/>
+    <p:sldId id="259" r:id="rId5"/>
+    <p:sldId id="260" r:id="rId6"/>
+    <p:sldId id="261" r:id="rId7"/>
+    <p:sldId id="265" r:id="rId8"/>
+    <p:sldId id="264" r:id="rId9"/>
+    <p:sldId id="262" r:id="rId10"/>
+    <p:sldId id="263" r:id="rId11"/>
   </p:sldIdLst>
   <p:sldSz cx="12192000" cy="6858000"/>
   <p:notesSz cx="6858000" cy="9144000"/>
@@ -106,6 +113,11 @@
       </a:defRPr>
     </a:lvl9pPr>
   </p:defaultTextStyle>
+  <p:extLst>
+    <p:ext uri="{EFAFB233-063F-42B5-8137-9DF3F51BA10A}">
+      <p15:sldGuideLst xmlns:p15="http://schemas.microsoft.com/office/powerpoint/2012/main"/>
+    </p:ext>
+  </p:extLst>
 </p:presentation>
 </file>
 
@@ -240,7 +252,7 @@
           <a:p>
             <a:fld id="{BF5BBEC5-3F23-4366-AEEC-A4ED1C6FF854}" type="datetimeFigureOut">
               <a:rPr lang="pl-PL" smtClean="0"/>
-              <a:t>07.01.2019</a:t>
+              <a:t>09.01.2019</a:t>
             </a:fld>
             <a:endParaRPr lang="pl-PL"/>
           </a:p>
@@ -410,7 +422,7 @@
           <a:p>
             <a:fld id="{BF5BBEC5-3F23-4366-AEEC-A4ED1C6FF854}" type="datetimeFigureOut">
               <a:rPr lang="pl-PL" smtClean="0"/>
-              <a:t>07.01.2019</a:t>
+              <a:t>09.01.2019</a:t>
             </a:fld>
             <a:endParaRPr lang="pl-PL"/>
           </a:p>
@@ -590,7 +602,7 @@
           <a:p>
             <a:fld id="{BF5BBEC5-3F23-4366-AEEC-A4ED1C6FF854}" type="datetimeFigureOut">
               <a:rPr lang="pl-PL" smtClean="0"/>
-              <a:t>07.01.2019</a:t>
+              <a:t>09.01.2019</a:t>
             </a:fld>
             <a:endParaRPr lang="pl-PL"/>
           </a:p>
@@ -760,7 +772,7 @@
           <a:p>
             <a:fld id="{BF5BBEC5-3F23-4366-AEEC-A4ED1C6FF854}" type="datetimeFigureOut">
               <a:rPr lang="pl-PL" smtClean="0"/>
-              <a:t>07.01.2019</a:t>
+              <a:t>09.01.2019</a:t>
             </a:fld>
             <a:endParaRPr lang="pl-PL"/>
           </a:p>
@@ -1006,7 +1018,7 @@
           <a:p>
             <a:fld id="{BF5BBEC5-3F23-4366-AEEC-A4ED1C6FF854}" type="datetimeFigureOut">
               <a:rPr lang="pl-PL" smtClean="0"/>
-              <a:t>07.01.2019</a:t>
+              <a:t>09.01.2019</a:t>
             </a:fld>
             <a:endParaRPr lang="pl-PL"/>
           </a:p>
@@ -1238,7 +1250,7 @@
           <a:p>
             <a:fld id="{BF5BBEC5-3F23-4366-AEEC-A4ED1C6FF854}" type="datetimeFigureOut">
               <a:rPr lang="pl-PL" smtClean="0"/>
-              <a:t>07.01.2019</a:t>
+              <a:t>09.01.2019</a:t>
             </a:fld>
             <a:endParaRPr lang="pl-PL"/>
           </a:p>
@@ -1605,7 +1617,7 @@
           <a:p>
             <a:fld id="{BF5BBEC5-3F23-4366-AEEC-A4ED1C6FF854}" type="datetimeFigureOut">
               <a:rPr lang="pl-PL" smtClean="0"/>
-              <a:t>07.01.2019</a:t>
+              <a:t>09.01.2019</a:t>
             </a:fld>
             <a:endParaRPr lang="pl-PL"/>
           </a:p>
@@ -1723,7 +1735,7 @@
           <a:p>
             <a:fld id="{BF5BBEC5-3F23-4366-AEEC-A4ED1C6FF854}" type="datetimeFigureOut">
               <a:rPr lang="pl-PL" smtClean="0"/>
-              <a:t>07.01.2019</a:t>
+              <a:t>09.01.2019</a:t>
             </a:fld>
             <a:endParaRPr lang="pl-PL"/>
           </a:p>
@@ -1818,7 +1830,7 @@
           <a:p>
             <a:fld id="{BF5BBEC5-3F23-4366-AEEC-A4ED1C6FF854}" type="datetimeFigureOut">
               <a:rPr lang="pl-PL" smtClean="0"/>
-              <a:t>07.01.2019</a:t>
+              <a:t>09.01.2019</a:t>
             </a:fld>
             <a:endParaRPr lang="pl-PL"/>
           </a:p>
@@ -2095,7 +2107,7 @@
           <a:p>
             <a:fld id="{BF5BBEC5-3F23-4366-AEEC-A4ED1C6FF854}" type="datetimeFigureOut">
               <a:rPr lang="pl-PL" smtClean="0"/>
-              <a:t>07.01.2019</a:t>
+              <a:t>09.01.2019</a:t>
             </a:fld>
             <a:endParaRPr lang="pl-PL"/>
           </a:p>
@@ -2348,7 +2360,7 @@
           <a:p>
             <a:fld id="{BF5BBEC5-3F23-4366-AEEC-A4ED1C6FF854}" type="datetimeFigureOut">
               <a:rPr lang="pl-PL" smtClean="0"/>
-              <a:t>07.01.2019</a:t>
+              <a:t>09.01.2019</a:t>
             </a:fld>
             <a:endParaRPr lang="pl-PL"/>
           </a:p>
@@ -2561,7 +2573,7 @@
           <a:p>
             <a:fld id="{BF5BBEC5-3F23-4366-AEEC-A4ED1C6FF854}" type="datetimeFigureOut">
               <a:rPr lang="pl-PL" smtClean="0"/>
-              <a:t>07.01.2019</a:t>
+              <a:t>09.01.2019</a:t>
             </a:fld>
             <a:endParaRPr lang="pl-PL"/>
           </a:p>
@@ -3253,6 +3265,85 @@
 </p:sld>
 </file>
 
+<file path=ppt/slides/slide10.xml><?xml version="1.0" encoding="utf-8"?>
+<p:sld xmlns:a="http://schemas.openxmlformats.org/drawingml/2006/main" xmlns:r="http://schemas.openxmlformats.org/officeDocument/2006/relationships" xmlns:p="http://schemas.openxmlformats.org/presentationml/2006/main">
+  <p:cSld>
+    <p:spTree>
+      <p:nvGrpSpPr>
+        <p:cNvPr id="1" name=""/>
+        <p:cNvGrpSpPr/>
+        <p:nvPr/>
+      </p:nvGrpSpPr>
+      <p:grpSpPr>
+        <a:xfrm>
+          <a:off x="0" y="0"/>
+          <a:ext cx="0" cy="0"/>
+          <a:chOff x="0" y="0"/>
+          <a:chExt cx="0" cy="0"/>
+        </a:xfrm>
+      </p:grpSpPr>
+      <p:sp>
+        <p:nvSpPr>
+          <p:cNvPr id="4" name="Title 3"/>
+          <p:cNvSpPr>
+            <a:spLocks noGrp="1"/>
+          </p:cNvSpPr>
+          <p:nvPr>
+            <p:ph type="ctrTitle"/>
+          </p:nvPr>
+        </p:nvSpPr>
+        <p:spPr/>
+        <p:txBody>
+          <a:bodyPr/>
+          <a:lstStyle/>
+          <a:p>
+            <a:r>
+              <a:rPr lang="pl-PL" dirty="0" smtClean="0"/>
+              <a:t>Dziękujemy za uwagę.</a:t>
+            </a:r>
+            <a:endParaRPr lang="pl-PL" dirty="0"/>
+          </a:p>
+        </p:txBody>
+      </p:sp>
+      <p:sp>
+        <p:nvSpPr>
+          <p:cNvPr id="5" name="Subtitle 4"/>
+          <p:cNvSpPr>
+            <a:spLocks noGrp="1"/>
+          </p:cNvSpPr>
+          <p:nvPr>
+            <p:ph type="subTitle" idx="1"/>
+          </p:nvPr>
+        </p:nvSpPr>
+        <p:spPr/>
+        <p:txBody>
+          <a:bodyPr/>
+          <a:lstStyle/>
+          <a:p>
+            <a:endParaRPr lang="pl-PL" dirty="0" smtClean="0"/>
+          </a:p>
+          <a:p>
+            <a:r>
+              <a:rPr lang="pl-PL" dirty="0" smtClean="0"/>
+              <a:t>Pytania?</a:t>
+            </a:r>
+            <a:endParaRPr lang="pl-PL" dirty="0"/>
+          </a:p>
+        </p:txBody>
+      </p:sp>
+    </p:spTree>
+    <p:extLst>
+      <p:ext uri="{BB962C8B-B14F-4D97-AF65-F5344CB8AC3E}">
+        <p14:creationId xmlns:p14="http://schemas.microsoft.com/office/powerpoint/2010/main" val="1741086671"/>
+      </p:ext>
+    </p:extLst>
+  </p:cSld>
+  <p:clrMapOvr>
+    <a:masterClrMapping/>
+  </p:clrMapOvr>
+</p:sld>
+</file>
+
 <file path=ppt/slides/slide2.xml><?xml version="1.0" encoding="utf-8"?>
 <p:sld xmlns:a="http://schemas.openxmlformats.org/drawingml/2006/main" xmlns:r="http://schemas.openxmlformats.org/officeDocument/2006/relationships" xmlns:p="http://schemas.openxmlformats.org/presentationml/2006/main">
   <p:cSld>
@@ -3436,7 +3527,7 @@
             </a:pPr>
             <a:r>
               <a:rPr lang="pl-PL" dirty="0" smtClean="0"/>
-              <a:t>Bleeee…</a:t>
+              <a:t>B</a:t>
             </a:r>
             <a:endParaRPr lang="pl-PL" dirty="0"/>
           </a:p>
@@ -3446,6 +3537,731 @@
     <p:extLst>
       <p:ext uri="{BB962C8B-B14F-4D97-AF65-F5344CB8AC3E}">
         <p14:creationId xmlns:p14="http://schemas.microsoft.com/office/powerpoint/2010/main" val="1807531547"/>
+      </p:ext>
+    </p:extLst>
+  </p:cSld>
+  <p:clrMapOvr>
+    <a:masterClrMapping/>
+  </p:clrMapOvr>
+</p:sld>
+</file>
+
+<file path=ppt/slides/slide4.xml><?xml version="1.0" encoding="utf-8"?>
+<p:sld xmlns:a="http://schemas.openxmlformats.org/drawingml/2006/main" xmlns:r="http://schemas.openxmlformats.org/officeDocument/2006/relationships" xmlns:p="http://schemas.openxmlformats.org/presentationml/2006/main">
+  <p:cSld>
+    <p:spTree>
+      <p:nvGrpSpPr>
+        <p:cNvPr id="1" name=""/>
+        <p:cNvGrpSpPr/>
+        <p:nvPr/>
+      </p:nvGrpSpPr>
+      <p:grpSpPr>
+        <a:xfrm>
+          <a:off x="0" y="0"/>
+          <a:ext cx="0" cy="0"/>
+          <a:chOff x="0" y="0"/>
+          <a:chExt cx="0" cy="0"/>
+        </a:xfrm>
+      </p:grpSpPr>
+      <p:sp>
+        <p:nvSpPr>
+          <p:cNvPr id="2" name="Title 1"/>
+          <p:cNvSpPr>
+            <a:spLocks noGrp="1"/>
+          </p:cNvSpPr>
+          <p:nvPr>
+            <p:ph type="title"/>
+          </p:nvPr>
+        </p:nvSpPr>
+        <p:spPr/>
+        <p:txBody>
+          <a:bodyPr/>
+          <a:lstStyle/>
+          <a:p>
+            <a:r>
+              <a:rPr lang="pl-PL" dirty="0"/>
+              <a:t>Profil potencialnego klienta serwisu</a:t>
+            </a:r>
+          </a:p>
+        </p:txBody>
+      </p:sp>
+      <p:sp>
+        <p:nvSpPr>
+          <p:cNvPr id="3" name="Content Placeholder 2"/>
+          <p:cNvSpPr>
+            <a:spLocks noGrp="1"/>
+          </p:cNvSpPr>
+          <p:nvPr>
+            <p:ph idx="1"/>
+          </p:nvPr>
+        </p:nvSpPr>
+        <p:spPr/>
+        <p:txBody>
+          <a:bodyPr/>
+          <a:lstStyle/>
+          <a:p>
+            <a:pPr marL="0" indent="0">
+              <a:buNone/>
+            </a:pPr>
+            <a:r>
+              <a:rPr lang="pl-PL" dirty="0" smtClean="0"/>
+              <a:t>Projekt kierowany jest dla przedsiębiorców i dla zwykłych ludzi. Jedni i drudzy mogą wystawiać swoje propozycje noclegów oraz rezerwować wybrane oferty.  </a:t>
+            </a:r>
+            <a:endParaRPr lang="pl-PL" dirty="0"/>
+          </a:p>
+        </p:txBody>
+      </p:sp>
+    </p:spTree>
+    <p:extLst>
+      <p:ext uri="{BB962C8B-B14F-4D97-AF65-F5344CB8AC3E}">
+        <p14:creationId xmlns:p14="http://schemas.microsoft.com/office/powerpoint/2010/main" val="178176783"/>
+      </p:ext>
+    </p:extLst>
+  </p:cSld>
+  <p:clrMapOvr>
+    <a:masterClrMapping/>
+  </p:clrMapOvr>
+</p:sld>
+</file>
+
+<file path=ppt/slides/slide5.xml><?xml version="1.0" encoding="utf-8"?>
+<p:sld xmlns:a="http://schemas.openxmlformats.org/drawingml/2006/main" xmlns:r="http://schemas.openxmlformats.org/officeDocument/2006/relationships" xmlns:p="http://schemas.openxmlformats.org/presentationml/2006/main">
+  <p:cSld>
+    <p:spTree>
+      <p:nvGrpSpPr>
+        <p:cNvPr id="1" name=""/>
+        <p:cNvGrpSpPr/>
+        <p:nvPr/>
+      </p:nvGrpSpPr>
+      <p:grpSpPr>
+        <a:xfrm>
+          <a:off x="0" y="0"/>
+          <a:ext cx="0" cy="0"/>
+          <a:chOff x="0" y="0"/>
+          <a:chExt cx="0" cy="0"/>
+        </a:xfrm>
+      </p:grpSpPr>
+      <p:sp>
+        <p:nvSpPr>
+          <p:cNvPr id="2" name="Title 1"/>
+          <p:cNvSpPr>
+            <a:spLocks noGrp="1"/>
+          </p:cNvSpPr>
+          <p:nvPr>
+            <p:ph type="title"/>
+          </p:nvPr>
+        </p:nvSpPr>
+        <p:spPr/>
+        <p:txBody>
+          <a:bodyPr/>
+          <a:lstStyle/>
+          <a:p>
+            <a:pPr marL="514350" indent="-514350"/>
+            <a:r>
+              <a:rPr lang="pl-PL" dirty="0"/>
+              <a:t>Główne funkcjonalności</a:t>
+            </a:r>
+          </a:p>
+        </p:txBody>
+      </p:sp>
+      <p:sp>
+        <p:nvSpPr>
+          <p:cNvPr id="3" name="Content Placeholder 2"/>
+          <p:cNvSpPr>
+            <a:spLocks noGrp="1"/>
+          </p:cNvSpPr>
+          <p:nvPr>
+            <p:ph idx="1"/>
+          </p:nvPr>
+        </p:nvSpPr>
+        <p:spPr/>
+        <p:txBody>
+          <a:bodyPr/>
+          <a:lstStyle/>
+          <a:p>
+            <a:pPr marL="0" indent="0">
+              <a:buNone/>
+            </a:pPr>
+            <a:r>
+              <a:rPr lang="pl-PL" dirty="0" smtClean="0"/>
+              <a:t>Logowanie</a:t>
+            </a:r>
+          </a:p>
+          <a:p>
+            <a:pPr marL="0" indent="0">
+              <a:buNone/>
+            </a:pPr>
+            <a:r>
+              <a:rPr lang="pl-PL" dirty="0" smtClean="0"/>
+              <a:t>Rejestracja</a:t>
+            </a:r>
+          </a:p>
+          <a:p>
+            <a:pPr marL="0" indent="0">
+              <a:buNone/>
+            </a:pPr>
+            <a:r>
+              <a:rPr lang="pl-PL" dirty="0" smtClean="0"/>
+              <a:t>Potwierdzanie rejestracji przez Administratora</a:t>
+            </a:r>
+          </a:p>
+          <a:p>
+            <a:pPr marL="0" indent="0">
+              <a:buNone/>
+            </a:pPr>
+            <a:r>
+              <a:rPr lang="pl-PL" dirty="0" smtClean="0"/>
+              <a:t>Dodawanie nowych ofert noclegów</a:t>
+            </a:r>
+          </a:p>
+          <a:p>
+            <a:pPr marL="0" indent="0">
+              <a:buNone/>
+            </a:pPr>
+            <a:r>
+              <a:rPr lang="pl-PL" dirty="0"/>
+              <a:t>Potwierdzanie ofert </a:t>
+            </a:r>
+            <a:r>
+              <a:rPr lang="pl-PL" dirty="0" smtClean="0"/>
+              <a:t>przez Administratora</a:t>
+            </a:r>
+          </a:p>
+          <a:p>
+            <a:pPr marL="0" indent="0">
+              <a:buNone/>
+            </a:pPr>
+            <a:r>
+              <a:rPr lang="pl-PL" dirty="0" smtClean="0"/>
+              <a:t>Rezerwacja ofert</a:t>
+            </a:r>
+          </a:p>
+          <a:p>
+            <a:pPr marL="0" indent="0">
+              <a:buNone/>
+            </a:pPr>
+            <a:r>
+              <a:rPr lang="pl-PL" dirty="0" smtClean="0"/>
+              <a:t>Potwierdzanie rezerwacji po przez płatność</a:t>
+            </a:r>
+          </a:p>
+          <a:p>
+            <a:pPr marL="0" indent="0">
+              <a:buNone/>
+            </a:pPr>
+            <a:r>
+              <a:rPr lang="pl-PL" dirty="0" smtClean="0"/>
+              <a:t>Anulowanie rezerwacji po przez anulowanie płatności</a:t>
+            </a:r>
+            <a:endParaRPr lang="pl-PL" dirty="0"/>
+          </a:p>
+        </p:txBody>
+      </p:sp>
+    </p:spTree>
+    <p:extLst>
+      <p:ext uri="{BB962C8B-B14F-4D97-AF65-F5344CB8AC3E}">
+        <p14:creationId xmlns:p14="http://schemas.microsoft.com/office/powerpoint/2010/main" val="2433895241"/>
+      </p:ext>
+    </p:extLst>
+  </p:cSld>
+  <p:clrMapOvr>
+    <a:masterClrMapping/>
+  </p:clrMapOvr>
+</p:sld>
+</file>
+
+<file path=ppt/slides/slide6.xml><?xml version="1.0" encoding="utf-8"?>
+<p:sld xmlns:a="http://schemas.openxmlformats.org/drawingml/2006/main" xmlns:r="http://schemas.openxmlformats.org/officeDocument/2006/relationships" xmlns:p="http://schemas.openxmlformats.org/presentationml/2006/main">
+  <p:cSld>
+    <p:spTree>
+      <p:nvGrpSpPr>
+        <p:cNvPr id="1" name=""/>
+        <p:cNvGrpSpPr/>
+        <p:nvPr/>
+      </p:nvGrpSpPr>
+      <p:grpSpPr>
+        <a:xfrm>
+          <a:off x="0" y="0"/>
+          <a:ext cx="0" cy="0"/>
+          <a:chOff x="0" y="0"/>
+          <a:chExt cx="0" cy="0"/>
+        </a:xfrm>
+      </p:grpSpPr>
+      <p:sp>
+        <p:nvSpPr>
+          <p:cNvPr id="2" name="Title 1"/>
+          <p:cNvSpPr>
+            <a:spLocks noGrp="1"/>
+          </p:cNvSpPr>
+          <p:nvPr>
+            <p:ph type="title"/>
+          </p:nvPr>
+        </p:nvSpPr>
+        <p:spPr/>
+        <p:txBody>
+          <a:bodyPr/>
+          <a:lstStyle/>
+          <a:p>
+            <a:r>
+              <a:rPr lang="pl-PL" dirty="0"/>
+              <a:t>Architektóra i użyte technologie</a:t>
+            </a:r>
+          </a:p>
+        </p:txBody>
+      </p:sp>
+      <p:sp>
+        <p:nvSpPr>
+          <p:cNvPr id="3" name="Content Placeholder 2"/>
+          <p:cNvSpPr>
+            <a:spLocks noGrp="1"/>
+          </p:cNvSpPr>
+          <p:nvPr>
+            <p:ph idx="1"/>
+          </p:nvPr>
+        </p:nvSpPr>
+        <p:spPr/>
+        <p:txBody>
+          <a:bodyPr>
+            <a:normAutofit fontScale="92500"/>
+          </a:bodyPr>
+          <a:lstStyle/>
+          <a:p>
+            <a:pPr marL="0" indent="0">
+              <a:buNone/>
+            </a:pPr>
+            <a:r>
+              <a:rPr lang="pl-PL" dirty="0" smtClean="0"/>
+              <a:t>	Projekt opiera się na scentralizowanej relacyjnej bazy danych MySQL która zawiera całą logikę wraz z danymi. Baza danych została wyposażona w szereg interfejsów pod postacią: procedur, funkcji i widoków.</a:t>
+            </a:r>
+          </a:p>
+          <a:p>
+            <a:pPr marL="0" indent="0">
+              <a:buNone/>
+            </a:pPr>
+            <a:r>
+              <a:rPr lang="pl-PL" dirty="0"/>
+              <a:t>	</a:t>
+            </a:r>
+            <a:r>
+              <a:rPr lang="pl-PL" dirty="0" smtClean="0"/>
+              <a:t>Obok bazy danych, na tej samej maszynie fizycznej znajduje się WebService który został napisany w PHP 7 z zastosowaniem frameworku Symfony 4. </a:t>
+            </a:r>
+          </a:p>
+          <a:p>
+            <a:pPr marL="0" indent="0">
+              <a:buNone/>
+            </a:pPr>
+            <a:r>
+              <a:rPr lang="pl-PL" dirty="0"/>
+              <a:t>	</a:t>
+            </a:r>
+            <a:r>
+              <a:rPr lang="pl-PL" dirty="0" smtClean="0"/>
+              <a:t>Została użyta architektura klient-serwer. Wspomniana wyżej maszyna fizyczna to serwer natomiast klientem jest przeglądarka internetowa. </a:t>
+            </a:r>
+          </a:p>
+          <a:p>
+            <a:pPr marL="0" indent="0">
+              <a:buNone/>
+            </a:pPr>
+            <a:r>
+              <a:rPr lang="pl-PL" dirty="0" smtClean="0"/>
+              <a:t>	Od strony klienta działa strona internetowa napisana w HTML5 z użyciem JS i CSS3. </a:t>
+            </a:r>
+            <a:endParaRPr lang="pl-PL" dirty="0"/>
+          </a:p>
+        </p:txBody>
+      </p:sp>
+    </p:spTree>
+    <p:extLst>
+      <p:ext uri="{BB962C8B-B14F-4D97-AF65-F5344CB8AC3E}">
+        <p14:creationId xmlns:p14="http://schemas.microsoft.com/office/powerpoint/2010/main" val="2219077538"/>
+      </p:ext>
+    </p:extLst>
+  </p:cSld>
+  <p:clrMapOvr>
+    <a:masterClrMapping/>
+  </p:clrMapOvr>
+</p:sld>
+</file>
+
+<file path=ppt/slides/slide7.xml><?xml version="1.0" encoding="utf-8"?>
+<p:sld xmlns:a="http://schemas.openxmlformats.org/drawingml/2006/main" xmlns:r="http://schemas.openxmlformats.org/officeDocument/2006/relationships" xmlns:p="http://schemas.openxmlformats.org/presentationml/2006/main">
+  <p:cSld>
+    <p:spTree>
+      <p:nvGrpSpPr>
+        <p:cNvPr id="1" name=""/>
+        <p:cNvGrpSpPr/>
+        <p:nvPr/>
+      </p:nvGrpSpPr>
+      <p:grpSpPr>
+        <a:xfrm>
+          <a:off x="0" y="0"/>
+          <a:ext cx="0" cy="0"/>
+          <a:chOff x="0" y="0"/>
+          <a:chExt cx="0" cy="0"/>
+        </a:xfrm>
+      </p:grpSpPr>
+      <p:sp>
+        <p:nvSpPr>
+          <p:cNvPr id="2" name="Title 1"/>
+          <p:cNvSpPr>
+            <a:spLocks noGrp="1"/>
+          </p:cNvSpPr>
+          <p:nvPr>
+            <p:ph type="title"/>
+          </p:nvPr>
+        </p:nvSpPr>
+        <p:spPr/>
+        <p:txBody>
+          <a:bodyPr/>
+          <a:lstStyle/>
+          <a:p>
+            <a:r>
+              <a:rPr lang="pl-PL" dirty="0"/>
+              <a:t>Architektóra i użyte </a:t>
+            </a:r>
+            <a:r>
+              <a:rPr lang="pl-PL" dirty="0" smtClean="0"/>
+              <a:t>technologie c.d.</a:t>
+            </a:r>
+            <a:endParaRPr lang="pl-PL" dirty="0"/>
+          </a:p>
+        </p:txBody>
+      </p:sp>
+      <p:pic>
+        <p:nvPicPr>
+          <p:cNvPr id="1026" name="Picture 2"/>
+          <p:cNvPicPr>
+            <a:picLocks noChangeAspect="1" noChangeArrowheads="1"/>
+          </p:cNvPicPr>
+          <p:nvPr/>
+        </p:nvPicPr>
+        <p:blipFill>
+          <a:blip r:embed="rId2">
+            <a:extLst>
+              <a:ext uri="{28A0092B-C50C-407E-A947-70E740481C1C}">
+                <a14:useLocalDpi xmlns:a14="http://schemas.microsoft.com/office/drawing/2010/main" val="0"/>
+              </a:ext>
+            </a:extLst>
+          </a:blip>
+          <a:srcRect/>
+          <a:stretch>
+            <a:fillRect/>
+          </a:stretch>
+        </p:blipFill>
+        <p:spPr bwMode="auto">
+          <a:xfrm>
+            <a:off x="1269093" y="1250089"/>
+            <a:ext cx="6121400" cy="5676900"/>
+          </a:xfrm>
+          <a:prstGeom prst="rect">
+            <a:avLst/>
+          </a:prstGeom>
+          <a:noFill/>
+          <a:ln>
+            <a:noFill/>
+          </a:ln>
+          <a:extLst>
+            <a:ext uri="{909E8E84-426E-40DD-AFC4-6F175D3DCCD1}">
+              <a14:hiddenFill xmlns:a14="http://schemas.microsoft.com/office/drawing/2010/main">
+                <a:solidFill>
+                  <a:srgbClr val="FFFFFF"/>
+                </a:solidFill>
+              </a14:hiddenFill>
+            </a:ext>
+            <a:ext uri="{91240B29-F687-4F45-9708-019B960494DF}">
+              <a14:hiddenLine xmlns:a14="http://schemas.microsoft.com/office/drawing/2010/main" w="9525">
+                <a:solidFill>
+                  <a:srgbClr val="000000"/>
+                </a:solidFill>
+                <a:miter lim="800000"/>
+                <a:headEnd/>
+                <a:tailEnd/>
+              </a14:hiddenLine>
+            </a:ext>
+          </a:extLst>
+        </p:spPr>
+      </p:pic>
+    </p:spTree>
+    <p:extLst>
+      <p:ext uri="{BB962C8B-B14F-4D97-AF65-F5344CB8AC3E}">
+        <p14:creationId xmlns:p14="http://schemas.microsoft.com/office/powerpoint/2010/main" val="1554217288"/>
+      </p:ext>
+    </p:extLst>
+  </p:cSld>
+  <p:clrMapOvr>
+    <a:masterClrMapping/>
+  </p:clrMapOvr>
+</p:sld>
+</file>
+
+<file path=ppt/slides/slide8.xml><?xml version="1.0" encoding="utf-8"?>
+<p:sld xmlns:a="http://schemas.openxmlformats.org/drawingml/2006/main" xmlns:r="http://schemas.openxmlformats.org/officeDocument/2006/relationships" xmlns:p="http://schemas.openxmlformats.org/presentationml/2006/main">
+  <p:cSld>
+    <p:spTree>
+      <p:nvGrpSpPr>
+        <p:cNvPr id="1" name=""/>
+        <p:cNvGrpSpPr/>
+        <p:nvPr/>
+      </p:nvGrpSpPr>
+      <p:grpSpPr>
+        <a:xfrm>
+          <a:off x="0" y="0"/>
+          <a:ext cx="0" cy="0"/>
+          <a:chOff x="0" y="0"/>
+          <a:chExt cx="0" cy="0"/>
+        </a:xfrm>
+      </p:grpSpPr>
+      <p:sp>
+        <p:nvSpPr>
+          <p:cNvPr id="2" name="Title 1"/>
+          <p:cNvSpPr>
+            <a:spLocks noGrp="1"/>
+          </p:cNvSpPr>
+          <p:nvPr>
+            <p:ph type="title"/>
+          </p:nvPr>
+        </p:nvSpPr>
+        <p:spPr/>
+        <p:txBody>
+          <a:bodyPr/>
+          <a:lstStyle/>
+          <a:p>
+            <a:r>
+              <a:rPr lang="pl-PL" dirty="0"/>
+              <a:t>Architektóra i użyte </a:t>
+            </a:r>
+            <a:r>
+              <a:rPr lang="pl-PL" dirty="0" smtClean="0"/>
+              <a:t>technologie c.d.</a:t>
+            </a:r>
+            <a:endParaRPr lang="pl-PL" dirty="0"/>
+          </a:p>
+        </p:txBody>
+      </p:sp>
+      <p:sp>
+        <p:nvSpPr>
+          <p:cNvPr id="3" name="Content Placeholder 2"/>
+          <p:cNvSpPr>
+            <a:spLocks noGrp="1"/>
+          </p:cNvSpPr>
+          <p:nvPr>
+            <p:ph idx="1"/>
+          </p:nvPr>
+        </p:nvSpPr>
+        <p:spPr/>
+        <p:txBody>
+          <a:bodyPr/>
+          <a:lstStyle/>
+          <a:p>
+            <a:pPr marL="0" indent="0">
+              <a:buNone/>
+            </a:pPr>
+            <a:r>
+              <a:rPr lang="pl-PL" dirty="0" smtClean="0"/>
+              <a:t>Plusy i minusy użytej architektóry:</a:t>
+            </a:r>
+          </a:p>
+          <a:p>
+            <a:pPr marL="0" indent="0">
+              <a:buNone/>
+            </a:pPr>
+            <a:r>
+              <a:rPr lang="pl-PL" dirty="0" smtClean="0"/>
+              <a:t>Plusy:</a:t>
+            </a:r>
+          </a:p>
+          <a:p>
+            <a:r>
+              <a:rPr lang="pl-PL" dirty="0" smtClean="0"/>
+              <a:t>łatwy </a:t>
+            </a:r>
+            <a:r>
+              <a:rPr lang="pl-PL" dirty="0"/>
+              <a:t>serwis, </a:t>
+            </a:r>
+            <a:endParaRPr lang="pl-PL" dirty="0" smtClean="0"/>
+          </a:p>
+          <a:p>
+            <a:r>
+              <a:rPr lang="pl-PL" dirty="0" smtClean="0"/>
+              <a:t>mały </a:t>
+            </a:r>
+            <a:r>
+              <a:rPr lang="pl-PL" dirty="0"/>
+              <a:t>koszt budowy, </a:t>
+            </a:r>
+            <a:endParaRPr lang="pl-PL" dirty="0" smtClean="0"/>
+          </a:p>
+          <a:p>
+            <a:r>
+              <a:rPr lang="pl-PL" dirty="0" smtClean="0"/>
+              <a:t>łatwa </a:t>
+            </a:r>
+            <a:r>
+              <a:rPr lang="pl-PL" dirty="0"/>
+              <a:t>migracja, </a:t>
+            </a:r>
+            <a:endParaRPr lang="pl-PL" dirty="0" smtClean="0"/>
+          </a:p>
+          <a:p>
+            <a:r>
+              <a:rPr lang="pl-PL" dirty="0" smtClean="0"/>
+              <a:t>szybka konfiguracja</a:t>
+            </a:r>
+          </a:p>
+          <a:p>
+            <a:pPr marL="0" indent="0">
+              <a:buNone/>
+            </a:pPr>
+            <a:r>
+              <a:rPr lang="pl-PL" dirty="0" smtClean="0"/>
+              <a:t>Minusy:</a:t>
+            </a:r>
+          </a:p>
+          <a:p>
+            <a:pPr marL="0" indent="0">
+              <a:buNone/>
+            </a:pPr>
+            <a:r>
+              <a:rPr lang="pl-PL" dirty="0"/>
+              <a:t>?</a:t>
+            </a:r>
+          </a:p>
+        </p:txBody>
+      </p:sp>
+    </p:spTree>
+    <p:extLst>
+      <p:ext uri="{BB962C8B-B14F-4D97-AF65-F5344CB8AC3E}">
+        <p14:creationId xmlns:p14="http://schemas.microsoft.com/office/powerpoint/2010/main" val="1581660104"/>
+      </p:ext>
+    </p:extLst>
+  </p:cSld>
+  <p:clrMapOvr>
+    <a:masterClrMapping/>
+  </p:clrMapOvr>
+</p:sld>
+</file>
+
+<file path=ppt/slides/slide9.xml><?xml version="1.0" encoding="utf-8"?>
+<p:sld xmlns:a="http://schemas.openxmlformats.org/drawingml/2006/main" xmlns:r="http://schemas.openxmlformats.org/officeDocument/2006/relationships" xmlns:p="http://schemas.openxmlformats.org/presentationml/2006/main">
+  <p:cSld>
+    <p:spTree>
+      <p:nvGrpSpPr>
+        <p:cNvPr id="1" name=""/>
+        <p:cNvGrpSpPr/>
+        <p:nvPr/>
+      </p:nvGrpSpPr>
+      <p:grpSpPr>
+        <a:xfrm>
+          <a:off x="0" y="0"/>
+          <a:ext cx="0" cy="0"/>
+          <a:chOff x="0" y="0"/>
+          <a:chExt cx="0" cy="0"/>
+        </a:xfrm>
+      </p:grpSpPr>
+      <p:sp>
+        <p:nvSpPr>
+          <p:cNvPr id="2" name="Title 1"/>
+          <p:cNvSpPr>
+            <a:spLocks noGrp="1"/>
+          </p:cNvSpPr>
+          <p:nvPr>
+            <p:ph type="title"/>
+          </p:nvPr>
+        </p:nvSpPr>
+        <p:spPr/>
+        <p:txBody>
+          <a:bodyPr/>
+          <a:lstStyle/>
+          <a:p>
+            <a:r>
+              <a:rPr lang="pl-PL" dirty="0"/>
+              <a:t>Możliwości </a:t>
+            </a:r>
+            <a:r>
+              <a:rPr lang="pl-PL" dirty="0" smtClean="0"/>
+              <a:t>rozwoju</a:t>
+            </a:r>
+            <a:endParaRPr lang="pl-PL" dirty="0"/>
+          </a:p>
+        </p:txBody>
+      </p:sp>
+      <p:sp>
+        <p:nvSpPr>
+          <p:cNvPr id="3" name="Content Placeholder 2"/>
+          <p:cNvSpPr>
+            <a:spLocks noGrp="1"/>
+          </p:cNvSpPr>
+          <p:nvPr>
+            <p:ph idx="1"/>
+          </p:nvPr>
+        </p:nvSpPr>
+        <p:spPr/>
+        <p:txBody>
+          <a:bodyPr/>
+          <a:lstStyle/>
+          <a:p>
+            <a:pPr marL="0" indent="0">
+              <a:buNone/>
+            </a:pPr>
+            <a:r>
+              <a:rPr lang="pl-PL" dirty="0" smtClean="0"/>
+              <a:t>Architektura systemu pozwala na łatwe dodawanie nowych modułów. Przyszłości </a:t>
+            </a:r>
+            <a:r>
+              <a:rPr lang="pl-PL" dirty="0"/>
+              <a:t>można do implementować:</a:t>
+            </a:r>
+            <a:endParaRPr lang="pl-PL" dirty="0" smtClean="0"/>
+          </a:p>
+          <a:p>
+            <a:pPr marL="514350" indent="-514350">
+              <a:buAutoNum type="arabicPeriod"/>
+            </a:pPr>
+            <a:r>
+              <a:rPr lang="pl-PL" dirty="0" smtClean="0"/>
+              <a:t>Procesy automatyczne które będą cyklicznie lub na żądanie wykonywać działania. </a:t>
+            </a:r>
+          </a:p>
+          <a:p>
+            <a:pPr marL="514350" indent="-514350">
+              <a:buAutoNum type="arabicPeriod"/>
+            </a:pPr>
+            <a:r>
+              <a:rPr lang="pl-PL" dirty="0" smtClean="0"/>
+              <a:t>Kalendarz </a:t>
+            </a:r>
+            <a:r>
+              <a:rPr lang="pl-PL" dirty="0"/>
+              <a:t>w konkretnej ofercie informujący potencjalnego klienta o dostępności oferty</a:t>
+            </a:r>
+            <a:r>
+              <a:rPr lang="pl-PL" dirty="0" smtClean="0"/>
+              <a:t>.</a:t>
+            </a:r>
+          </a:p>
+          <a:p>
+            <a:pPr marL="514350" indent="-514350">
+              <a:buAutoNum type="arabicPeriod"/>
+            </a:pPr>
+            <a:r>
+              <a:rPr lang="pl-PL" dirty="0"/>
+              <a:t>Obsługa zewnętrznego serwisu </a:t>
+            </a:r>
+            <a:r>
+              <a:rPr lang="pl-PL" dirty="0" smtClean="0"/>
+              <a:t>do płatności on-line </a:t>
+            </a:r>
+            <a:endParaRPr lang="pl-PL" dirty="0"/>
+          </a:p>
+        </p:txBody>
+      </p:sp>
+    </p:spTree>
+    <p:extLst>
+      <p:ext uri="{BB962C8B-B14F-4D97-AF65-F5344CB8AC3E}">
+        <p14:creationId xmlns:p14="http://schemas.microsoft.com/office/powerpoint/2010/main" val="97012678"/>
       </p:ext>
     </p:extLst>
   </p:cSld>

</xml_diff>

<commit_message>
Dodanie wstępu do prezentacji
</commit_message>
<xml_diff>
--- a/accommodation_announcements_presentation.pptx
+++ b/accommodation_announcements_presentation.pptx
@@ -252,7 +252,7 @@
           <a:p>
             <a:fld id="{BF5BBEC5-3F23-4366-AEEC-A4ED1C6FF854}" type="datetimeFigureOut">
               <a:rPr lang="pl-PL" smtClean="0"/>
-              <a:t>09.01.2019</a:t>
+              <a:t>12.01.2019</a:t>
             </a:fld>
             <a:endParaRPr lang="pl-PL"/>
           </a:p>
@@ -422,7 +422,7 @@
           <a:p>
             <a:fld id="{BF5BBEC5-3F23-4366-AEEC-A4ED1C6FF854}" type="datetimeFigureOut">
               <a:rPr lang="pl-PL" smtClean="0"/>
-              <a:t>09.01.2019</a:t>
+              <a:t>12.01.2019</a:t>
             </a:fld>
             <a:endParaRPr lang="pl-PL"/>
           </a:p>
@@ -602,7 +602,7 @@
           <a:p>
             <a:fld id="{BF5BBEC5-3F23-4366-AEEC-A4ED1C6FF854}" type="datetimeFigureOut">
               <a:rPr lang="pl-PL" smtClean="0"/>
-              <a:t>09.01.2019</a:t>
+              <a:t>12.01.2019</a:t>
             </a:fld>
             <a:endParaRPr lang="pl-PL"/>
           </a:p>
@@ -772,7 +772,7 @@
           <a:p>
             <a:fld id="{BF5BBEC5-3F23-4366-AEEC-A4ED1C6FF854}" type="datetimeFigureOut">
               <a:rPr lang="pl-PL" smtClean="0"/>
-              <a:t>09.01.2019</a:t>
+              <a:t>12.01.2019</a:t>
             </a:fld>
             <a:endParaRPr lang="pl-PL"/>
           </a:p>
@@ -1018,7 +1018,7 @@
           <a:p>
             <a:fld id="{BF5BBEC5-3F23-4366-AEEC-A4ED1C6FF854}" type="datetimeFigureOut">
               <a:rPr lang="pl-PL" smtClean="0"/>
-              <a:t>09.01.2019</a:t>
+              <a:t>12.01.2019</a:t>
             </a:fld>
             <a:endParaRPr lang="pl-PL"/>
           </a:p>
@@ -1250,7 +1250,7 @@
           <a:p>
             <a:fld id="{BF5BBEC5-3F23-4366-AEEC-A4ED1C6FF854}" type="datetimeFigureOut">
               <a:rPr lang="pl-PL" smtClean="0"/>
-              <a:t>09.01.2019</a:t>
+              <a:t>12.01.2019</a:t>
             </a:fld>
             <a:endParaRPr lang="pl-PL"/>
           </a:p>
@@ -1617,7 +1617,7 @@
           <a:p>
             <a:fld id="{BF5BBEC5-3F23-4366-AEEC-A4ED1C6FF854}" type="datetimeFigureOut">
               <a:rPr lang="pl-PL" smtClean="0"/>
-              <a:t>09.01.2019</a:t>
+              <a:t>12.01.2019</a:t>
             </a:fld>
             <a:endParaRPr lang="pl-PL"/>
           </a:p>
@@ -1735,7 +1735,7 @@
           <a:p>
             <a:fld id="{BF5BBEC5-3F23-4366-AEEC-A4ED1C6FF854}" type="datetimeFigureOut">
               <a:rPr lang="pl-PL" smtClean="0"/>
-              <a:t>09.01.2019</a:t>
+              <a:t>12.01.2019</a:t>
             </a:fld>
             <a:endParaRPr lang="pl-PL"/>
           </a:p>
@@ -1830,7 +1830,7 @@
           <a:p>
             <a:fld id="{BF5BBEC5-3F23-4366-AEEC-A4ED1C6FF854}" type="datetimeFigureOut">
               <a:rPr lang="pl-PL" smtClean="0"/>
-              <a:t>09.01.2019</a:t>
+              <a:t>12.01.2019</a:t>
             </a:fld>
             <a:endParaRPr lang="pl-PL"/>
           </a:p>
@@ -2107,7 +2107,7 @@
           <a:p>
             <a:fld id="{BF5BBEC5-3F23-4366-AEEC-A4ED1C6FF854}" type="datetimeFigureOut">
               <a:rPr lang="pl-PL" smtClean="0"/>
-              <a:t>09.01.2019</a:t>
+              <a:t>12.01.2019</a:t>
             </a:fld>
             <a:endParaRPr lang="pl-PL"/>
           </a:p>
@@ -2360,7 +2360,7 @@
           <a:p>
             <a:fld id="{BF5BBEC5-3F23-4366-AEEC-A4ED1C6FF854}" type="datetimeFigureOut">
               <a:rPr lang="pl-PL" smtClean="0"/>
-              <a:t>09.01.2019</a:t>
+              <a:t>12.01.2019</a:t>
             </a:fld>
             <a:endParaRPr lang="pl-PL"/>
           </a:p>
@@ -2573,7 +2573,7 @@
           <a:p>
             <a:fld id="{BF5BBEC5-3F23-4366-AEEC-A4ED1C6FF854}" type="datetimeFigureOut">
               <a:rPr lang="pl-PL" smtClean="0"/>
-              <a:t>09.01.2019</a:t>
+              <a:t>12.01.2019</a:t>
             </a:fld>
             <a:endParaRPr lang="pl-PL"/>
           </a:p>
@@ -3527,7 +3527,24 @@
             </a:pPr>
             <a:r>
               <a:rPr lang="pl-PL" dirty="0" smtClean="0"/>
-              <a:t>B</a:t>
+              <a:t>	Wyobraźmy sobie taką sytuację. Potrzebujemy wyjechać do innego miasta bo na przykład mamy ważne spotkanie biznesowe lub po prostu jedziemy wypocząć. Rezerwujemy nocleg, wyjeżdżamy i … i nasze mieszkanie stoi nieużytkowane przez cały czas naszego wyjazdu. Jest to bardzo nieekonomiczne dla naszego portfela. </a:t>
+            </a:r>
+          </a:p>
+          <a:p>
+            <a:pPr marL="0" indent="0">
+              <a:buNone/>
+            </a:pPr>
+            <a:r>
+              <a:rPr lang="pl-PL" dirty="0"/>
+              <a:t>	</a:t>
+            </a:r>
+            <a:r>
+              <a:rPr lang="pl-PL" dirty="0" smtClean="0"/>
+              <a:t>Po kilku długotrwałych nieobecnościach w mieszkaniu z powodów wyjazdów, narodził się pomysł. </a:t>
+            </a:r>
+            <a:r>
+              <a:rPr lang="pl-PL" dirty="0" smtClean="0"/>
+              <a:t>A gdyby tak istniała możliwość wynajęcia naszego mieszkania podczas naszej nieobecności? Moglibyśmy dużo zaoszczędzić. </a:t>
             </a:r>
             <a:endParaRPr lang="pl-PL" dirty="0"/>
           </a:p>
@@ -3605,7 +3622,31 @@
             </a:pPr>
             <a:r>
               <a:rPr lang="pl-PL" dirty="0" smtClean="0"/>
-              <a:t>Projekt kierowany jest dla przedsiębiorców i dla zwykłych ludzi. Jedni i drudzy mogą wystawiać swoje propozycje noclegów oraz rezerwować wybrane oferty.  </a:t>
+              <a:t>	Projekt </a:t>
+            </a:r>
+            <a:r>
+              <a:rPr lang="pl-PL" dirty="0" smtClean="0"/>
+              <a:t>kierowany </a:t>
+            </a:r>
+            <a:r>
+              <a:rPr lang="pl-PL" dirty="0" smtClean="0"/>
+              <a:t>jest zarówno dla </a:t>
+            </a:r>
+            <a:r>
+              <a:rPr lang="pl-PL" dirty="0" smtClean="0"/>
+              <a:t>przedsiębiorców </a:t>
+            </a:r>
+            <a:r>
+              <a:rPr lang="pl-PL" dirty="0" smtClean="0"/>
+              <a:t>jak i </a:t>
+            </a:r>
+            <a:r>
+              <a:rPr lang="pl-PL" dirty="0" smtClean="0"/>
+              <a:t>dla zwykłych </a:t>
+            </a:r>
+            <a:r>
+              <a:rPr lang="pl-PL" dirty="0" smtClean="0"/>
+              <a:t>ludzi, którzy chcą wynajmować i/lub udostępniać mieszkania na wynajem.</a:t>
             </a:r>
             <a:endParaRPr lang="pl-PL" dirty="0"/>
           </a:p>

</xml_diff>

<commit_message>
Opis widoków, korekta błędów językowych
</commit_message>
<xml_diff>
--- a/accommodation_announcements_presentation.pptx
+++ b/accommodation_announcements_presentation.pptx
@@ -18,22 +18,23 @@
     <p:sldId id="271" r:id="rId12"/>
     <p:sldId id="272" r:id="rId13"/>
     <p:sldId id="273" r:id="rId14"/>
-    <p:sldId id="274" r:id="rId15"/>
+    <p:sldId id="285" r:id="rId15"/>
     <p:sldId id="275" r:id="rId16"/>
     <p:sldId id="276" r:id="rId17"/>
-    <p:sldId id="277" r:id="rId18"/>
-    <p:sldId id="278" r:id="rId19"/>
-    <p:sldId id="279" r:id="rId20"/>
-    <p:sldId id="280" r:id="rId21"/>
-    <p:sldId id="281" r:id="rId22"/>
-    <p:sldId id="282" r:id="rId23"/>
-    <p:sldId id="283" r:id="rId24"/>
-    <p:sldId id="284" r:id="rId25"/>
-    <p:sldId id="261" r:id="rId26"/>
-    <p:sldId id="265" r:id="rId27"/>
-    <p:sldId id="264" r:id="rId28"/>
-    <p:sldId id="262" r:id="rId29"/>
-    <p:sldId id="263" r:id="rId30"/>
+    <p:sldId id="274" r:id="rId18"/>
+    <p:sldId id="277" r:id="rId19"/>
+    <p:sldId id="278" r:id="rId20"/>
+    <p:sldId id="279" r:id="rId21"/>
+    <p:sldId id="280" r:id="rId22"/>
+    <p:sldId id="281" r:id="rId23"/>
+    <p:sldId id="282" r:id="rId24"/>
+    <p:sldId id="283" r:id="rId25"/>
+    <p:sldId id="284" r:id="rId26"/>
+    <p:sldId id="261" r:id="rId27"/>
+    <p:sldId id="265" r:id="rId28"/>
+    <p:sldId id="264" r:id="rId29"/>
+    <p:sldId id="262" r:id="rId30"/>
+    <p:sldId id="263" r:id="rId31"/>
   </p:sldIdLst>
   <p:sldSz cx="9144000" cy="5143500" type="screen16x9"/>
   <p:notesSz cx="6858000" cy="9144000"/>
@@ -134,7 +135,7 @@
   </p:defaultTextStyle>
   <p:extLst>
     <p:ext uri="{EFAFB233-063F-42B5-8137-9DF3F51BA10A}">
-      <p15:sldGuideLst xmlns="" xmlns:p15="http://schemas.microsoft.com/office/powerpoint/2012/main"/>
+      <p15:sldGuideLst xmlns:p15="http://schemas.microsoft.com/office/powerpoint/2012/main" xmlns=""/>
     </p:ext>
   </p:extLst>
 </p:presentation>
@@ -3124,13 +3125,20 @@
     </p:spTree>
     <p:extLst>
       <p:ext uri="{BB962C8B-B14F-4D97-AF65-F5344CB8AC3E}">
-        <p14:creationId xmlns="" xmlns:p14="http://schemas.microsoft.com/office/powerpoint/2010/main" val="3501191804"/>
+        <p14:creationId xmlns:p14="http://schemas.microsoft.com/office/powerpoint/2010/main" xmlns="" val="3501191804"/>
       </p:ext>
     </p:extLst>
   </p:cSld>
   <p:clrMapOvr>
     <a:masterClrMapping/>
   </p:clrMapOvr>
+  <p:timing>
+    <p:tnLst>
+      <p:par>
+        <p:cTn id="1" dur="indefinite" restart="never" nodeType="tmRoot"/>
+      </p:par>
+    </p:tnLst>
+  </p:timing>
 </p:sld>
 </file>
 
@@ -3249,6 +3257,13 @@
   <p:clrMapOvr>
     <a:masterClrMapping/>
   </p:clrMapOvr>
+  <p:timing>
+    <p:tnLst>
+      <p:par>
+        <p:cTn id="1" dur="indefinite" restart="never" nodeType="tmRoot"/>
+      </p:par>
+    </p:tnLst>
+  </p:timing>
 </p:sld>
 </file>
 
@@ -3362,6 +3377,13 @@
   <p:clrMapOvr>
     <a:masterClrMapping/>
   </p:clrMapOvr>
+  <p:timing>
+    <p:tnLst>
+      <p:par>
+        <p:cTn id="1" dur="indefinite" restart="never" nodeType="tmRoot"/>
+      </p:par>
+    </p:tnLst>
+  </p:timing>
 </p:sld>
 </file>
 
@@ -3459,7 +3481,11 @@
             </a:pPr>
             <a:r>
               <a:rPr lang="pl-PL" dirty="0" smtClean="0"/>
-              <a:t>Moje konto – widok użytkownika</a:t>
+              <a:t>Szczegóły konta – </a:t>
+            </a:r>
+            <a:r>
+              <a:rPr lang="pl-PL" dirty="0" smtClean="0"/>
+              <a:t>widok użytkownika</a:t>
             </a:r>
           </a:p>
           <a:p>
@@ -3486,7 +3512,15 @@
             </a:pPr>
             <a:r>
               <a:rPr lang="pl-PL" dirty="0" smtClean="0"/>
-              <a:t>Moje konto – administrator systemu</a:t>
+              <a:t>Szczegóły konta</a:t>
+            </a:r>
+            <a:r>
+              <a:rPr lang="pl-PL" dirty="0" smtClean="0"/>
+              <a:t> </a:t>
+            </a:r>
+            <a:r>
+              <a:rPr lang="pl-PL" dirty="0" smtClean="0"/>
+              <a:t>– administrator systemu</a:t>
             </a:r>
           </a:p>
           <a:p>
@@ -3495,92 +3529,57 @@
             </a:pPr>
             <a:r>
               <a:rPr lang="pl-PL" dirty="0" smtClean="0"/>
+              <a:t>	Oferty</a:t>
+            </a:r>
+          </a:p>
+          <a:p>
+            <a:pPr>
+              <a:buNone/>
+            </a:pPr>
+            <a:r>
+              <a:rPr lang="pl-PL" dirty="0" smtClean="0"/>
+              <a:t>	Oferty do zatwierdzenia</a:t>
+            </a:r>
+          </a:p>
+          <a:p>
+            <a:pPr>
+              <a:buNone/>
+            </a:pPr>
+            <a:r>
+              <a:rPr lang="pl-PL" dirty="0" smtClean="0"/>
+              <a:t>	Klienci do zatwierdzenia</a:t>
+            </a:r>
+          </a:p>
+          <a:p>
+            <a:pPr>
+              <a:buNone/>
+            </a:pPr>
+            <a:r>
+              <a:rPr lang="pl-PL" dirty="0" smtClean="0"/>
+              <a:t>	Klienci </a:t>
+            </a:r>
+          </a:p>
+          <a:p>
+            <a:pPr>
+              <a:buNone/>
+            </a:pPr>
+            <a:r>
+              <a:rPr lang="pl-PL" dirty="0" smtClean="0"/>
+              <a:t>	Płatności</a:t>
+            </a:r>
+          </a:p>
+          <a:p>
+            <a:pPr>
+              <a:buNone/>
+            </a:pPr>
+            <a:r>
+              <a:rPr lang="pl-PL" dirty="0" smtClean="0"/>
               <a:t>	</a:t>
             </a:r>
             <a:r>
               <a:rPr lang="pl-PL" dirty="0" smtClean="0"/>
-              <a:t>Oferty</a:t>
-            </a:r>
-          </a:p>
-          <a:p>
-            <a:pPr>
-              <a:buNone/>
-            </a:pPr>
-            <a:r>
-              <a:rPr lang="pl-PL" dirty="0" smtClean="0"/>
-              <a:t>	</a:t>
-            </a:r>
-            <a:r>
-              <a:rPr lang="pl-PL" dirty="0" smtClean="0"/>
-              <a:t>Oferty do zatwierdzenia</a:t>
-            </a:r>
-          </a:p>
-          <a:p>
-            <a:pPr>
-              <a:buNone/>
-            </a:pPr>
-            <a:r>
-              <a:rPr lang="pl-PL" dirty="0" smtClean="0"/>
-              <a:t>	</a:t>
-            </a:r>
-            <a:r>
-              <a:rPr lang="pl-PL" dirty="0" smtClean="0"/>
-              <a:t>Klienci do zatwierdzenia</a:t>
-            </a:r>
-          </a:p>
-          <a:p>
-            <a:pPr>
-              <a:buNone/>
-            </a:pPr>
-            <a:r>
-              <a:rPr lang="pl-PL" dirty="0" smtClean="0"/>
-              <a:t>	</a:t>
-            </a:r>
-            <a:r>
-              <a:rPr lang="pl-PL" dirty="0" smtClean="0"/>
-              <a:t>Klienci </a:t>
-            </a:r>
-          </a:p>
-          <a:p>
-            <a:pPr>
-              <a:buNone/>
-            </a:pPr>
-            <a:r>
-              <a:rPr lang="pl-PL" dirty="0" smtClean="0"/>
-              <a:t>	</a:t>
-            </a:r>
-            <a:r>
-              <a:rPr lang="pl-PL" dirty="0" smtClean="0"/>
-              <a:t>Płatności</a:t>
-            </a:r>
-          </a:p>
-          <a:p>
-            <a:pPr>
-              <a:buNone/>
-            </a:pPr>
-            <a:r>
-              <a:rPr lang="pl-PL" dirty="0" smtClean="0"/>
-              <a:t>	</a:t>
-            </a:r>
-            <a:r>
-              <a:rPr lang="pl-PL" dirty="0" smtClean="0"/>
               <a:t>Rezerwacje</a:t>
             </a:r>
-          </a:p>
-          <a:p>
-            <a:pPr>
-              <a:buNone/>
-            </a:pPr>
-            <a:r>
-              <a:rPr lang="pl-PL" dirty="0" smtClean="0"/>
-              <a:t>	</a:t>
-            </a:r>
-            <a:endParaRPr lang="pl-PL" dirty="0" smtClean="0"/>
-          </a:p>
-          <a:p>
-            <a:pPr>
-              <a:buNone/>
-            </a:pPr>
             <a:endParaRPr lang="pl-PL" dirty="0"/>
           </a:p>
         </p:txBody>
@@ -3590,6 +3589,13 @@
   <p:clrMapOvr>
     <a:masterClrMapping/>
   </p:clrMapOvr>
+  <p:timing>
+    <p:tnLst>
+      <p:par>
+        <p:cTn id="1" dur="indefinite" restart="never" nodeType="tmRoot"/>
+      </p:par>
+    </p:tnLst>
+  </p:timing>
 </p:sld>
 </file>
 
@@ -3634,11 +3640,7 @@
           <a:p>
             <a:r>
               <a:rPr lang="pl-PL" dirty="0" smtClean="0"/>
-              <a:t>Strona </a:t>
-            </a:r>
-            <a:r>
-              <a:rPr lang="pl-PL" dirty="0" smtClean="0"/>
-              <a:t>główna</a:t>
+              <a:t>Strona główna</a:t>
             </a:r>
             <a:endParaRPr lang="pl-PL" dirty="0"/>
           </a:p>
@@ -3708,6 +3710,13 @@
   <p:clrMapOvr>
     <a:masterClrMapping/>
   </p:clrMapOvr>
+  <p:timing>
+    <p:tnLst>
+      <p:par>
+        <p:cTn id="1" dur="indefinite" restart="never" nodeType="tmRoot"/>
+      </p:par>
+    </p:tnLst>
+  </p:timing>
 </p:sld>
 </file>
 
@@ -3741,7 +3750,7 @@
         <p:spPr>
           <a:xfrm>
             <a:off x="457200" y="205979"/>
-            <a:ext cx="2913681" cy="857250"/>
+            <a:ext cx="2634712" cy="857250"/>
           </a:xfrm>
         </p:spPr>
         <p:txBody>
@@ -3769,27 +3778,34 @@
         <p:spPr>
           <a:xfrm>
             <a:off x="609600" y="1200155"/>
-            <a:ext cx="2486526" cy="3394472"/>
-          </a:xfrm>
-        </p:spPr>
-        <p:txBody>
-          <a:bodyPr/>
-          <a:lstStyle/>
-          <a:p>
+            <a:ext cx="2510589" cy="3394472"/>
+          </a:xfrm>
+        </p:spPr>
+        <p:txBody>
+          <a:bodyPr/>
+          <a:lstStyle/>
+          <a:p>
+            <a:pPr algn="ctr">
+              <a:buNone/>
+            </a:pPr>
+            <a:r>
+              <a:rPr lang="pl-PL" dirty="0" smtClean="0"/>
+              <a:t>Widok ofert dodanych przez użytkowników i zatwierdzonych, opublikowanych w systemie przez administratora. Widok dostępny również dla gości.</a:t>
+            </a:r>
             <a:endParaRPr lang="pl-PL" dirty="0"/>
           </a:p>
         </p:txBody>
       </p:sp>
       <p:pic>
         <p:nvPicPr>
-          <p:cNvPr id="2050" name="Picture 2" descr="C:\Users\Janek\Desktop\Shoty\Screenshot_2019-01-13 Moje konto – Accs.png"/>
+          <p:cNvPr id="1026" name="Picture 2" descr="C:\Users\Janek\Desktop\Shoty\Screenshot_2019-01-13 Moje konto – Accommodation Announcements(1).png"/>
           <p:cNvPicPr>
             <a:picLocks noChangeAspect="1" noChangeArrowheads="1"/>
           </p:cNvPicPr>
           <p:nvPr/>
         </p:nvPicPr>
         <p:blipFill>
-          <a:blip r:embed="rId2"/>
+          <a:blip r:embed="rId2" cstate="print"/>
           <a:srcRect/>
           <a:stretch>
             <a:fillRect/>
@@ -3797,8 +3813,8 @@
         </p:blipFill>
         <p:spPr bwMode="auto">
           <a:xfrm>
-            <a:off x="3456122" y="255165"/>
-            <a:ext cx="5540643" cy="4674255"/>
+            <a:off x="5558674" y="158853"/>
+            <a:ext cx="3143624" cy="4823853"/>
           </a:xfrm>
           <a:prstGeom prst="rect">
             <a:avLst/>
@@ -3811,6 +3827,13 @@
   <p:clrMapOvr>
     <a:masterClrMapping/>
   </p:clrMapOvr>
+  <p:timing>
+    <p:tnLst>
+      <p:par>
+        <p:cTn id="1" dur="indefinite" restart="never" nodeType="tmRoot"/>
+      </p:par>
+    </p:tnLst>
+  </p:timing>
 </p:sld>
 </file>
 
@@ -3851,6 +3874,10 @@
           <a:bodyPr/>
           <a:lstStyle/>
           <a:p>
+            <a:r>
+              <a:rPr lang="pl-PL" dirty="0" smtClean="0"/>
+              <a:t>Kontakt</a:t>
+            </a:r>
             <a:endParaRPr lang="pl-PL" dirty="0"/>
           </a:p>
         </p:txBody>
@@ -3875,6 +3902,13 @@
           <a:bodyPr/>
           <a:lstStyle/>
           <a:p>
+            <a:pPr algn="ctr">
+              <a:buNone/>
+            </a:pPr>
+            <a:r>
+              <a:rPr lang="pl-PL" dirty="0" smtClean="0"/>
+              <a:t>Widok kontakt. Możliwość kontaktu bezpośrednio do każdego z twórców systemu lub skrzynka ogólna do kontaktu z klientami.</a:t>
+            </a:r>
             <a:endParaRPr lang="pl-PL" dirty="0"/>
           </a:p>
         </p:txBody>
@@ -3910,6 +3944,13 @@
   <p:clrMapOvr>
     <a:masterClrMapping/>
   </p:clrMapOvr>
+  <p:timing>
+    <p:tnLst>
+      <p:par>
+        <p:cTn id="1" dur="indefinite" restart="never" nodeType="tmRoot"/>
+      </p:par>
+    </p:tnLst>
+  </p:timing>
 </p:sld>
 </file>
 
@@ -3943,7 +3984,7 @@
         <p:spPr>
           <a:xfrm>
             <a:off x="224590" y="205979"/>
-            <a:ext cx="3781722" cy="857250"/>
+            <a:ext cx="3580244" cy="857250"/>
           </a:xfrm>
         </p:spPr>
         <p:txBody>
@@ -3954,7 +3995,15 @@
           <a:p>
             <a:r>
               <a:rPr lang="pl-PL" sz="2400" dirty="0" smtClean="0"/>
-              <a:t>Moje konto - </a:t>
+              <a:t>Szczegóły konta</a:t>
+            </a:r>
+            <a:r>
+              <a:rPr lang="pl-PL" sz="2400" dirty="0" smtClean="0"/>
+              <a:t> </a:t>
+            </a:r>
+            <a:r>
+              <a:rPr lang="pl-PL" sz="2400" dirty="0" smtClean="0"/>
+              <a:t>- </a:t>
             </a:r>
             <a:r>
               <a:rPr lang="pl-PL" sz="2400" dirty="0" err="1" smtClean="0"/>
@@ -3984,6 +4033,13 @@
           <a:bodyPr/>
           <a:lstStyle/>
           <a:p>
+            <a:pPr algn="ctr">
+              <a:buNone/>
+            </a:pPr>
+            <a:r>
+              <a:rPr lang="pl-PL" dirty="0" smtClean="0"/>
+              <a:t>Widok Szczegóły konta. Użytkownik ma wgląd do wprowadzonych podczas rejestracji danych, możliwość ich edycji i zmiany hasła. </a:t>
+            </a:r>
             <a:endParaRPr lang="pl-PL" dirty="0"/>
           </a:p>
         </p:txBody>
@@ -4019,6 +4075,13 @@
   <p:clrMapOvr>
     <a:masterClrMapping/>
   </p:clrMapOvr>
+  <p:timing>
+    <p:tnLst>
+      <p:par>
+        <p:cTn id="1" dur="indefinite" restart="never" nodeType="tmRoot"/>
+      </p:par>
+    </p:tnLst>
+  </p:timing>
 </p:sld>
 </file>
 
@@ -4052,16 +4115,16 @@
         <p:spPr>
           <a:xfrm>
             <a:off x="457200" y="205979"/>
-            <a:ext cx="3136232" cy="857250"/>
-          </a:xfrm>
-        </p:spPr>
-        <p:txBody>
-          <a:bodyPr/>
-          <a:lstStyle/>
-          <a:p>
-            <a:r>
-              <a:rPr lang="pl-PL" dirty="0" smtClean="0"/>
-              <a:t>Moje rezerwacje</a:t>
+            <a:ext cx="2913681" cy="857250"/>
+          </a:xfrm>
+        </p:spPr>
+        <p:txBody>
+          <a:bodyPr/>
+          <a:lstStyle/>
+          <a:p>
+            <a:r>
+              <a:rPr lang="pl-PL" dirty="0" smtClean="0"/>
+              <a:t>Moje oferty</a:t>
             </a:r>
             <a:endParaRPr lang="pl-PL" dirty="0"/>
           </a:p>
@@ -4080,20 +4143,27 @@
         <p:spPr>
           <a:xfrm>
             <a:off x="609600" y="1200155"/>
-            <a:ext cx="2406316" cy="3394472"/>
-          </a:xfrm>
-        </p:spPr>
-        <p:txBody>
-          <a:bodyPr/>
-          <a:lstStyle/>
-          <a:p>
+            <a:ext cx="2486526" cy="3394472"/>
+          </a:xfrm>
+        </p:spPr>
+        <p:txBody>
+          <a:bodyPr/>
+          <a:lstStyle/>
+          <a:p>
+            <a:pPr algn="ctr">
+              <a:buNone/>
+            </a:pPr>
+            <a:r>
+              <a:rPr lang="pl-PL" dirty="0" smtClean="0"/>
+              <a:t>Widok listy ofert dodanych przez użytkownika. Użytkownik ma wgląd do dodanych ofert oraz ma możliwość dodania nowej oferty.</a:t>
+            </a:r>
             <a:endParaRPr lang="pl-PL" dirty="0"/>
           </a:p>
         </p:txBody>
       </p:sp>
       <p:pic>
         <p:nvPicPr>
-          <p:cNvPr id="5122" name="Picture 2" descr="C:\Users\Janek\Desktop\Shoty\Screenshot_2019-01-13 Moje konto – Accommodation Announcements(4).png"/>
+          <p:cNvPr id="2050" name="Picture 2" descr="C:\Users\Janek\Desktop\Shoty\Screenshot_2019-01-13 Moje konto – Accs.png"/>
           <p:cNvPicPr>
             <a:picLocks noChangeAspect="1" noChangeArrowheads="1"/>
           </p:cNvPicPr>
@@ -4108,8 +4178,8 @@
         </p:blipFill>
         <p:spPr bwMode="auto">
           <a:xfrm>
-            <a:off x="3669519" y="183262"/>
-            <a:ext cx="5373741" cy="4905720"/>
+            <a:off x="3456122" y="255165"/>
+            <a:ext cx="5540643" cy="4674255"/>
           </a:xfrm>
           <a:prstGeom prst="rect">
             <a:avLst/>
@@ -4122,6 +4192,13 @@
   <p:clrMapOvr>
     <a:masterClrMapping/>
   </p:clrMapOvr>
+  <p:timing>
+    <p:tnLst>
+      <p:par>
+        <p:cTn id="1" dur="indefinite" restart="never" nodeType="tmRoot"/>
+      </p:par>
+    </p:tnLst>
+  </p:timing>
 </p:sld>
 </file>
 
@@ -4154,51 +4231,58 @@
         </p:nvSpPr>
         <p:spPr>
           <a:xfrm>
-            <a:off x="309965" y="205979"/>
-            <a:ext cx="2975675" cy="857250"/>
+            <a:off x="457200" y="205979"/>
+            <a:ext cx="3136232" cy="857250"/>
+          </a:xfrm>
+        </p:spPr>
+        <p:txBody>
+          <a:bodyPr/>
+          <a:lstStyle/>
+          <a:p>
+            <a:r>
+              <a:rPr lang="pl-PL" dirty="0" smtClean="0"/>
+              <a:t>Moje rezerwacje</a:t>
+            </a:r>
+            <a:endParaRPr lang="pl-PL" dirty="0"/>
+          </a:p>
+        </p:txBody>
+      </p:sp>
+      <p:sp>
+        <p:nvSpPr>
+          <p:cNvPr id="3" name="Symbol zastępczy zawartości 2"/>
+          <p:cNvSpPr>
+            <a:spLocks noGrp="1"/>
+          </p:cNvSpPr>
+          <p:nvPr>
+            <p:ph sz="half" idx="1"/>
+          </p:nvPr>
+        </p:nvSpPr>
+        <p:spPr>
+          <a:xfrm>
+            <a:off x="609600" y="1200155"/>
+            <a:ext cx="2406316" cy="3394472"/>
           </a:xfrm>
         </p:spPr>
         <p:txBody>
           <a:bodyPr>
-            <a:normAutofit/>
+            <a:normAutofit lnSpcReduction="10000"/>
           </a:bodyPr>
           <a:lstStyle/>
           <a:p>
-            <a:r>
-              <a:rPr lang="pl-PL" sz="2400" dirty="0" smtClean="0"/>
-              <a:t>Moje konto - administrator</a:t>
-            </a:r>
-            <a:endParaRPr lang="pl-PL" sz="2400" dirty="0"/>
-          </a:p>
-        </p:txBody>
-      </p:sp>
-      <p:sp>
-        <p:nvSpPr>
-          <p:cNvPr id="3" name="Symbol zastępczy zawartości 2"/>
-          <p:cNvSpPr>
-            <a:spLocks noGrp="1"/>
-          </p:cNvSpPr>
-          <p:nvPr>
-            <p:ph sz="half" idx="1"/>
-          </p:nvPr>
-        </p:nvSpPr>
-        <p:spPr>
-          <a:xfrm>
-            <a:off x="609600" y="1200155"/>
-            <a:ext cx="2582779" cy="3394472"/>
-          </a:xfrm>
-        </p:spPr>
-        <p:txBody>
-          <a:bodyPr/>
-          <a:lstStyle/>
-          <a:p>
+            <a:pPr algn="ctr">
+              <a:buNone/>
+            </a:pPr>
+            <a:r>
+              <a:rPr lang="pl-PL" dirty="0" smtClean="0"/>
+              <a:t>Widok Moje rezerwacje pozwala na wgląd w dokonane przez użytkownika rezerwacje, dodatkowo funkcja pozwala dokonać płatności i informuje o statusie płatności.</a:t>
+            </a:r>
             <a:endParaRPr lang="pl-PL" dirty="0"/>
           </a:p>
         </p:txBody>
       </p:sp>
       <p:pic>
         <p:nvPicPr>
-          <p:cNvPr id="6146" name="Picture 2" descr="C:\Users\Janek\Desktop\Shoty\Screenshot_2019-01-13 Moje konto – Action Announcements.png"/>
+          <p:cNvPr id="5122" name="Picture 2" descr="C:\Users\Janek\Desktop\Shoty\Screenshot_2019-01-13 Moje konto – Accommodation Announcements(4).png"/>
           <p:cNvPicPr>
             <a:picLocks noChangeAspect="1" noChangeArrowheads="1"/>
           </p:cNvPicPr>
@@ -4213,8 +4297,8 @@
         </p:blipFill>
         <p:spPr bwMode="auto">
           <a:xfrm>
-            <a:off x="3681430" y="314452"/>
-            <a:ext cx="5284339" cy="4667082"/>
+            <a:off x="3669519" y="183262"/>
+            <a:ext cx="5373741" cy="4905720"/>
           </a:xfrm>
           <a:prstGeom prst="rect">
             <a:avLst/>
@@ -4227,6 +4311,13 @@
   <p:clrMapOvr>
     <a:masterClrMapping/>
   </p:clrMapOvr>
+  <p:timing>
+    <p:tnLst>
+      <p:par>
+        <p:cTn id="1" dur="indefinite" restart="never" nodeType="tmRoot"/>
+      </p:par>
+    </p:tnLst>
+  </p:timing>
 </p:sld>
 </file>
 
@@ -4259,8 +4350,8 @@
         </p:nvSpPr>
         <p:spPr>
           <a:xfrm>
-            <a:off x="248653" y="205979"/>
-            <a:ext cx="3160294" cy="857250"/>
+            <a:off x="309965" y="205979"/>
+            <a:ext cx="2975675" cy="857250"/>
           </a:xfrm>
         </p:spPr>
         <p:txBody>
@@ -4271,7 +4362,7 @@
           <a:p>
             <a:r>
               <a:rPr lang="pl-PL" sz="2400" dirty="0" smtClean="0"/>
-              <a:t>Oferty</a:t>
+              <a:t>Moje konto - administrator</a:t>
             </a:r>
             <a:endParaRPr lang="pl-PL" sz="2400" dirty="0"/>
           </a:p>
@@ -4290,20 +4381,48 @@
         <p:spPr>
           <a:xfrm>
             <a:off x="609600" y="1200155"/>
-            <a:ext cx="2326105" cy="3394472"/>
-          </a:xfrm>
-        </p:spPr>
-        <p:txBody>
-          <a:bodyPr/>
-          <a:lstStyle/>
-          <a:p>
+            <a:ext cx="2582779" cy="3394472"/>
+          </a:xfrm>
+        </p:spPr>
+        <p:txBody>
+          <a:bodyPr/>
+          <a:lstStyle/>
+          <a:p>
+            <a:pPr algn="ctr">
+              <a:buNone/>
+            </a:pPr>
+            <a:r>
+              <a:rPr lang="pl-PL" dirty="0" smtClean="0"/>
+              <a:t>Widok Szczegóły </a:t>
+            </a:r>
+            <a:r>
+              <a:rPr lang="pl-PL" dirty="0" smtClean="0"/>
+              <a:t>konta dla konta administratora. Administrator </a:t>
+            </a:r>
+            <a:r>
+              <a:rPr lang="pl-PL" dirty="0" smtClean="0"/>
+              <a:t>ma wgląd </a:t>
+            </a:r>
+            <a:r>
+              <a:rPr lang="pl-PL" dirty="0" smtClean="0"/>
+              <a:t>do </a:t>
+            </a:r>
+            <a:r>
+              <a:rPr lang="pl-PL" dirty="0" smtClean="0"/>
+              <a:t>danych, możliwość ich edycji i zmiany hasła. </a:t>
+            </a:r>
+          </a:p>
+          <a:p>
+            <a:pPr>
+              <a:buNone/>
+            </a:pPr>
             <a:endParaRPr lang="pl-PL" dirty="0"/>
           </a:p>
         </p:txBody>
       </p:sp>
       <p:pic>
         <p:nvPicPr>
-          <p:cNvPr id="7170" name="Picture 2" descr="C:\Users\Janek\Desktop\Shoty\Screenshot_2019-01-13 Moje konto – Accommodation Announcements(6).png"/>
+          <p:cNvPr id="6146" name="Picture 2" descr="C:\Users\Janek\Desktop\Shoty\Screenshot_2019-01-13 Moje konto – Action Announcements.png"/>
           <p:cNvPicPr>
             <a:picLocks noChangeAspect="1" noChangeArrowheads="1"/>
           </p:cNvPicPr>
@@ -4318,8 +4437,8 @@
         </p:blipFill>
         <p:spPr bwMode="auto">
           <a:xfrm>
-            <a:off x="3665349" y="270446"/>
-            <a:ext cx="5331417" cy="4648329"/>
+            <a:off x="3681430" y="314452"/>
+            <a:ext cx="5284339" cy="4667082"/>
           </a:xfrm>
           <a:prstGeom prst="rect">
             <a:avLst/>
@@ -4332,6 +4451,13 @@
   <p:clrMapOvr>
     <a:masterClrMapping/>
   </p:clrMapOvr>
+  <p:timing>
+    <p:tnLst>
+      <p:par>
+        <p:cTn id="1" dur="indefinite" restart="never" nodeType="tmRoot"/>
+      </p:par>
+    </p:tnLst>
+  </p:timing>
 </p:sld>
 </file>
 
@@ -4448,13 +4574,20 @@
     </p:spTree>
     <p:extLst>
       <p:ext uri="{BB962C8B-B14F-4D97-AF65-F5344CB8AC3E}">
-        <p14:creationId xmlns="" xmlns:p14="http://schemas.microsoft.com/office/powerpoint/2010/main" val="863505633"/>
+        <p14:creationId xmlns:p14="http://schemas.microsoft.com/office/powerpoint/2010/main" xmlns="" val="863505633"/>
       </p:ext>
     </p:extLst>
   </p:cSld>
   <p:clrMapOvr>
     <a:masterClrMapping/>
   </p:clrMapOvr>
+  <p:timing>
+    <p:tnLst>
+      <p:par>
+        <p:cTn id="1" dur="indefinite" restart="never" nodeType="tmRoot"/>
+      </p:par>
+    </p:tnLst>
+  </p:timing>
 </p:sld>
 </file>
 
@@ -4487,8 +4620,8 @@
         </p:nvSpPr>
         <p:spPr>
           <a:xfrm>
-            <a:off x="272716" y="205979"/>
-            <a:ext cx="3168316" cy="857250"/>
+            <a:off x="248653" y="205979"/>
+            <a:ext cx="3160294" cy="857250"/>
           </a:xfrm>
         </p:spPr>
         <p:txBody>
@@ -4499,7 +4632,7 @@
           <a:p>
             <a:r>
               <a:rPr lang="pl-PL" sz="2400" dirty="0" smtClean="0"/>
-              <a:t>Oferty do zatwierdzenia</a:t>
+              <a:t>Oferty</a:t>
             </a:r>
             <a:endParaRPr lang="pl-PL" sz="2400" dirty="0"/>
           </a:p>
@@ -4518,20 +4651,27 @@
         <p:spPr>
           <a:xfrm>
             <a:off x="609600" y="1200155"/>
-            <a:ext cx="2598821" cy="3394472"/>
-          </a:xfrm>
-        </p:spPr>
-        <p:txBody>
-          <a:bodyPr/>
-          <a:lstStyle/>
-          <a:p>
+            <a:ext cx="2326105" cy="3394472"/>
+          </a:xfrm>
+        </p:spPr>
+        <p:txBody>
+          <a:bodyPr/>
+          <a:lstStyle/>
+          <a:p>
+            <a:pPr algn="ctr">
+              <a:buNone/>
+            </a:pPr>
+            <a:r>
+              <a:rPr lang="pl-PL" dirty="0" smtClean="0"/>
+              <a:t>Widok aktywnych ofert pozwala administratorowi systemu na zarządzanie opublikowanymi ofertami. Możliwość podglądu i edycji ofert.</a:t>
+            </a:r>
             <a:endParaRPr lang="pl-PL" dirty="0"/>
           </a:p>
         </p:txBody>
       </p:sp>
       <p:pic>
         <p:nvPicPr>
-          <p:cNvPr id="8194" name="Picture 2" descr="C:\Users\Janek\Desktop\Shoty\Screenshot_2019-01-13uncements.png"/>
+          <p:cNvPr id="7170" name="Picture 2" descr="C:\Users\Janek\Desktop\Shoty\Screenshot_2019-01-13 Moje konto – Accommodation Announcements(6).png"/>
           <p:cNvPicPr>
             <a:picLocks noChangeAspect="1" noChangeArrowheads="1"/>
           </p:cNvPicPr>
@@ -4546,8 +4686,8 @@
         </p:blipFill>
         <p:spPr bwMode="auto">
           <a:xfrm>
-            <a:off x="3696703" y="325465"/>
-            <a:ext cx="5284565" cy="4679950"/>
+            <a:off x="3665349" y="270446"/>
+            <a:ext cx="5331417" cy="4648329"/>
           </a:xfrm>
           <a:prstGeom prst="rect">
             <a:avLst/>
@@ -4560,6 +4700,13 @@
   <p:clrMapOvr>
     <a:masterClrMapping/>
   </p:clrMapOvr>
+  <p:timing>
+    <p:tnLst>
+      <p:par>
+        <p:cTn id="1" dur="indefinite" restart="never" nodeType="tmRoot"/>
+      </p:par>
+    </p:tnLst>
+  </p:timing>
 </p:sld>
 </file>
 
@@ -4593,7 +4740,7 @@
         <p:spPr>
           <a:xfrm>
             <a:off x="272716" y="205979"/>
-            <a:ext cx="3248526" cy="857250"/>
+            <a:ext cx="3168316" cy="857250"/>
           </a:xfrm>
         </p:spPr>
         <p:txBody>
@@ -4604,7 +4751,7 @@
           <a:p>
             <a:r>
               <a:rPr lang="pl-PL" sz="2400" dirty="0" smtClean="0"/>
-              <a:t>Klienci do zatwierdzenia</a:t>
+              <a:t>Oferty do zatwierdzenia</a:t>
             </a:r>
             <a:endParaRPr lang="pl-PL" sz="2400" dirty="0"/>
           </a:p>
@@ -4623,20 +4770,29 @@
         <p:spPr>
           <a:xfrm>
             <a:off x="609600" y="1200155"/>
-            <a:ext cx="2518611" cy="3394472"/>
-          </a:xfrm>
-        </p:spPr>
-        <p:txBody>
-          <a:bodyPr/>
-          <a:lstStyle/>
-          <a:p>
+            <a:ext cx="2598821" cy="3394472"/>
+          </a:xfrm>
+        </p:spPr>
+        <p:txBody>
+          <a:bodyPr>
+            <a:normAutofit fontScale="92500"/>
+          </a:bodyPr>
+          <a:lstStyle/>
+          <a:p>
+            <a:pPr algn="ctr">
+              <a:buNone/>
+            </a:pPr>
+            <a:r>
+              <a:rPr lang="pl-PL" dirty="0" smtClean="0"/>
+              <a:t>Widok listy ofert stworzonych przez użytkownika i gotowych do zatwierdzenia, opublikowania przez administratora. Administrator ma podgląd oferty i opcję zatwierdzenia. </a:t>
+            </a:r>
             <a:endParaRPr lang="pl-PL" dirty="0"/>
           </a:p>
         </p:txBody>
       </p:sp>
       <p:pic>
         <p:nvPicPr>
-          <p:cNvPr id="9218" name="Picture 2" descr="C:\Users\Janek\Desktop\Shoty\Screenshot_2019-01-13 Moje konto – Accommodation Announcements(7).png"/>
+          <p:cNvPr id="8194" name="Picture 2" descr="C:\Users\Janek\Desktop\Shoty\Screenshot_2019-01-13uncements.png"/>
           <p:cNvPicPr>
             <a:picLocks noChangeAspect="1" noChangeArrowheads="1"/>
           </p:cNvPicPr>
@@ -4651,8 +4807,8 @@
         </p:blipFill>
         <p:spPr bwMode="auto">
           <a:xfrm>
-            <a:off x="3603356" y="348711"/>
-            <a:ext cx="5380474" cy="4675475"/>
+            <a:off x="3696703" y="325465"/>
+            <a:ext cx="5284565" cy="4679950"/>
           </a:xfrm>
           <a:prstGeom prst="rect">
             <a:avLst/>
@@ -4665,6 +4821,13 @@
   <p:clrMapOvr>
     <a:masterClrMapping/>
   </p:clrMapOvr>
+  <p:timing>
+    <p:tnLst>
+      <p:par>
+        <p:cTn id="1" dur="indefinite" restart="never" nodeType="tmRoot"/>
+      </p:par>
+    </p:tnLst>
+  </p:timing>
 </p:sld>
 </file>
 
@@ -4697,19 +4860,21 @@
         </p:nvSpPr>
         <p:spPr>
           <a:xfrm>
-            <a:off x="457200" y="205979"/>
-            <a:ext cx="2791326" cy="857250"/>
-          </a:xfrm>
-        </p:spPr>
-        <p:txBody>
-          <a:bodyPr/>
-          <a:lstStyle/>
-          <a:p>
-            <a:r>
-              <a:rPr lang="pl-PL" dirty="0" smtClean="0"/>
-              <a:t>Klienci</a:t>
-            </a:r>
-            <a:endParaRPr lang="pl-PL" dirty="0"/>
+            <a:off x="272716" y="205979"/>
+            <a:ext cx="3248526" cy="857250"/>
+          </a:xfrm>
+        </p:spPr>
+        <p:txBody>
+          <a:bodyPr>
+            <a:normAutofit/>
+          </a:bodyPr>
+          <a:lstStyle/>
+          <a:p>
+            <a:r>
+              <a:rPr lang="pl-PL" sz="2400" dirty="0" smtClean="0"/>
+              <a:t>Klienci do zatwierdzenia</a:t>
+            </a:r>
+            <a:endParaRPr lang="pl-PL" sz="2400" dirty="0"/>
           </a:p>
         </p:txBody>
       </p:sp>
@@ -4726,20 +4891,27 @@
         <p:spPr>
           <a:xfrm>
             <a:off x="609600" y="1200155"/>
-            <a:ext cx="2622884" cy="3394472"/>
-          </a:xfrm>
-        </p:spPr>
-        <p:txBody>
-          <a:bodyPr/>
-          <a:lstStyle/>
-          <a:p>
+            <a:ext cx="2518611" cy="3394472"/>
+          </a:xfrm>
+        </p:spPr>
+        <p:txBody>
+          <a:bodyPr/>
+          <a:lstStyle/>
+          <a:p>
+            <a:pPr algn="ctr">
+              <a:buNone/>
+            </a:pPr>
+            <a:r>
+              <a:rPr lang="pl-PL" dirty="0" smtClean="0"/>
+              <a:t>Widok listy użytkowników, którzy zarejestrowali się w systemu i oczekują za zatwierdzenie przez administratora. </a:t>
+            </a:r>
             <a:endParaRPr lang="pl-PL" dirty="0"/>
           </a:p>
         </p:txBody>
       </p:sp>
       <p:pic>
         <p:nvPicPr>
-          <p:cNvPr id="10242" name="Picture 2" descr="C:\Users\Janek\Desktop\Shoty\Screenshot_2019-01-13 Moje konto – Accommodation Announcements(8).png"/>
+          <p:cNvPr id="9218" name="Picture 2" descr="C:\Users\Janek\Desktop\Shoty\Screenshot_2019-01-13 Moje konto – Accommodation Announcements(7).png"/>
           <p:cNvPicPr>
             <a:picLocks noChangeAspect="1" noChangeArrowheads="1"/>
           </p:cNvPicPr>
@@ -4754,8 +4926,8 @@
         </p:blipFill>
         <p:spPr bwMode="auto">
           <a:xfrm>
-            <a:off x="3673098" y="255722"/>
-            <a:ext cx="5358502" cy="4794788"/>
+            <a:off x="3603356" y="348711"/>
+            <a:ext cx="5380474" cy="4675475"/>
           </a:xfrm>
           <a:prstGeom prst="rect">
             <a:avLst/>
@@ -4768,6 +4940,13 @@
   <p:clrMapOvr>
     <a:masterClrMapping/>
   </p:clrMapOvr>
+  <p:timing>
+    <p:tnLst>
+      <p:par>
+        <p:cTn id="1" dur="indefinite" restart="never" nodeType="tmRoot"/>
+      </p:par>
+    </p:tnLst>
+  </p:timing>
 </p:sld>
 </file>
 
@@ -4801,16 +4980,16 @@
         <p:spPr>
           <a:xfrm>
             <a:off x="457200" y="205979"/>
-            <a:ext cx="2622884" cy="857250"/>
-          </a:xfrm>
-        </p:spPr>
-        <p:txBody>
-          <a:bodyPr/>
-          <a:lstStyle/>
-          <a:p>
-            <a:r>
-              <a:rPr lang="pl-PL" dirty="0" smtClean="0"/>
-              <a:t>Płatności</a:t>
+            <a:ext cx="2791326" cy="857250"/>
+          </a:xfrm>
+        </p:spPr>
+        <p:txBody>
+          <a:bodyPr/>
+          <a:lstStyle/>
+          <a:p>
+            <a:r>
+              <a:rPr lang="pl-PL" dirty="0" smtClean="0"/>
+              <a:t>Klienci</a:t>
             </a:r>
             <a:endParaRPr lang="pl-PL" dirty="0"/>
           </a:p>
@@ -4829,20 +5008,35 @@
         <p:spPr>
           <a:xfrm>
             <a:off x="609600" y="1200155"/>
-            <a:ext cx="2414337" cy="3394472"/>
-          </a:xfrm>
-        </p:spPr>
-        <p:txBody>
-          <a:bodyPr/>
-          <a:lstStyle/>
-          <a:p>
+            <a:ext cx="2622884" cy="3394472"/>
+          </a:xfrm>
+        </p:spPr>
+        <p:txBody>
+          <a:bodyPr/>
+          <a:lstStyle/>
+          <a:p>
+            <a:pPr algn="ctr">
+              <a:buNone/>
+            </a:pPr>
+            <a:r>
+              <a:rPr lang="pl-PL" dirty="0" smtClean="0"/>
+              <a:t>Widok listy użytkowników zatwierdzonych przez </a:t>
+            </a:r>
+            <a:r>
+              <a:rPr lang="pl-PL" dirty="0" err="1" smtClean="0"/>
+              <a:t>administatora</a:t>
+            </a:r>
+            <a:r>
+              <a:rPr lang="pl-PL" dirty="0" smtClean="0"/>
+              <a:t> i mających możliwość logowania w systemie.</a:t>
+            </a:r>
             <a:endParaRPr lang="pl-PL" dirty="0"/>
           </a:p>
         </p:txBody>
       </p:sp>
       <p:pic>
         <p:nvPicPr>
-          <p:cNvPr id="11266" name="Picture 2" descr="C:\Users\Janek\Desktop\Shoty\Screenshot_2019-01-13 Moje konto – Accommodation Announcements(9).png"/>
+          <p:cNvPr id="10242" name="Picture 2" descr="C:\Users\Janek\Desktop\Shoty\Screenshot_2019-01-13 Moje konto – Accommodation Announcements(8).png"/>
           <p:cNvPicPr>
             <a:picLocks noChangeAspect="1" noChangeArrowheads="1"/>
           </p:cNvPicPr>
@@ -4857,8 +5051,8 @@
         </p:blipFill>
         <p:spPr bwMode="auto">
           <a:xfrm>
-            <a:off x="3787336" y="286719"/>
-            <a:ext cx="5180285" cy="4729112"/>
+            <a:off x="3673098" y="255722"/>
+            <a:ext cx="5358502" cy="4794788"/>
           </a:xfrm>
           <a:prstGeom prst="rect">
             <a:avLst/>
@@ -4871,6 +5065,13 @@
   <p:clrMapOvr>
     <a:masterClrMapping/>
   </p:clrMapOvr>
+  <p:timing>
+    <p:tnLst>
+      <p:par>
+        <p:cTn id="1" dur="indefinite" restart="never" nodeType="tmRoot"/>
+      </p:par>
+    </p:tnLst>
+  </p:timing>
 </p:sld>
 </file>
 
@@ -4904,16 +5105,16 @@
         <p:spPr>
           <a:xfrm>
             <a:off x="457200" y="205979"/>
-            <a:ext cx="2318084" cy="857250"/>
-          </a:xfrm>
-        </p:spPr>
-        <p:txBody>
-          <a:bodyPr/>
-          <a:lstStyle/>
-          <a:p>
-            <a:r>
-              <a:rPr lang="pl-PL" dirty="0" smtClean="0"/>
-              <a:t>Rezerwacje</a:t>
+            <a:ext cx="2622884" cy="857250"/>
+          </a:xfrm>
+        </p:spPr>
+        <p:txBody>
+          <a:bodyPr/>
+          <a:lstStyle/>
+          <a:p>
+            <a:r>
+              <a:rPr lang="pl-PL" dirty="0" smtClean="0"/>
+              <a:t>Płatności</a:t>
             </a:r>
             <a:endParaRPr lang="pl-PL" dirty="0"/>
           </a:p>
@@ -4932,20 +5133,27 @@
         <p:spPr>
           <a:xfrm>
             <a:off x="609600" y="1200155"/>
-            <a:ext cx="2253916" cy="3394472"/>
-          </a:xfrm>
-        </p:spPr>
-        <p:txBody>
-          <a:bodyPr/>
-          <a:lstStyle/>
-          <a:p>
+            <a:ext cx="2414337" cy="3394472"/>
+          </a:xfrm>
+        </p:spPr>
+        <p:txBody>
+          <a:bodyPr/>
+          <a:lstStyle/>
+          <a:p>
+            <a:pPr algn="ctr">
+              <a:buNone/>
+            </a:pPr>
+            <a:r>
+              <a:rPr lang="pl-PL" dirty="0" smtClean="0"/>
+              <a:t>Lista płatności dokonanych przez użytkowników oraz status płatności. </a:t>
+            </a:r>
             <a:endParaRPr lang="pl-PL" dirty="0"/>
           </a:p>
         </p:txBody>
       </p:sp>
       <p:pic>
         <p:nvPicPr>
-          <p:cNvPr id="12290" name="Picture 2" descr="C:\Users\Janek\Desktop\Shoty\Screenshot_2019-01-13 Moje konto – Accommodation Announcements(10).png"/>
+          <p:cNvPr id="11266" name="Picture 2" descr="C:\Users\Janek\Desktop\Shoty\Screenshot_2019-01-13 Moje konto – Accommodation Announcements(9).png"/>
           <p:cNvPicPr>
             <a:picLocks noChangeAspect="1" noChangeArrowheads="1"/>
           </p:cNvPicPr>
@@ -4960,8 +5168,8 @@
         </p:blipFill>
         <p:spPr bwMode="auto">
           <a:xfrm>
-            <a:off x="3820332" y="326661"/>
-            <a:ext cx="5155477" cy="4706465"/>
+            <a:off x="3787336" y="286719"/>
+            <a:ext cx="5180285" cy="4729112"/>
           </a:xfrm>
           <a:prstGeom prst="rect">
             <a:avLst/>
@@ -4974,6 +5182,13 @@
   <p:clrMapOvr>
     <a:masterClrMapping/>
   </p:clrMapOvr>
+  <p:timing>
+    <p:tnLst>
+      <p:par>
+        <p:cTn id="1" dur="indefinite" restart="never" nodeType="tmRoot"/>
+      </p:par>
+    </p:tnLst>
+  </p:timing>
 </p:sld>
 </file>
 
@@ -4996,7 +5211,7 @@
       </p:grpSpPr>
       <p:sp>
         <p:nvSpPr>
-          <p:cNvPr id="2" name="Title 1"/>
+          <p:cNvPr id="2" name="Tytuł 1"/>
           <p:cNvSpPr>
             <a:spLocks noGrp="1"/>
           </p:cNvSpPr>
@@ -5004,95 +5219,93 @@
             <p:ph type="title"/>
           </p:nvPr>
         </p:nvSpPr>
-        <p:spPr/>
-        <p:txBody>
-          <a:bodyPr/>
-          <a:lstStyle/>
-          <a:p>
-            <a:r>
-              <a:rPr lang="pl-PL" dirty="0" smtClean="0"/>
-              <a:t>Architektura </a:t>
-            </a:r>
-            <a:r>
-              <a:rPr lang="pl-PL" dirty="0"/>
-              <a:t>i użyte technologie</a:t>
-            </a:r>
-          </a:p>
-        </p:txBody>
-      </p:sp>
-      <p:sp>
-        <p:nvSpPr>
-          <p:cNvPr id="3" name="Content Placeholder 2"/>
-          <p:cNvSpPr>
-            <a:spLocks noGrp="1"/>
-          </p:cNvSpPr>
-          <p:nvPr>
-            <p:ph idx="1"/>
-          </p:nvPr>
-        </p:nvSpPr>
-        <p:spPr/>
-        <p:txBody>
-          <a:bodyPr>
-            <a:normAutofit fontScale="85000" lnSpcReduction="10000"/>
-          </a:bodyPr>
-          <a:lstStyle/>
-          <a:p>
-            <a:pPr marL="0" indent="0">
+        <p:spPr>
+          <a:xfrm>
+            <a:off x="457200" y="205979"/>
+            <a:ext cx="2318084" cy="857250"/>
+          </a:xfrm>
+        </p:spPr>
+        <p:txBody>
+          <a:bodyPr/>
+          <a:lstStyle/>
+          <a:p>
+            <a:r>
+              <a:rPr lang="pl-PL" dirty="0" smtClean="0"/>
+              <a:t>Rezerwacje</a:t>
+            </a:r>
+            <a:endParaRPr lang="pl-PL" dirty="0"/>
+          </a:p>
+        </p:txBody>
+      </p:sp>
+      <p:sp>
+        <p:nvSpPr>
+          <p:cNvPr id="3" name="Symbol zastępczy zawartości 2"/>
+          <p:cNvSpPr>
+            <a:spLocks noGrp="1"/>
+          </p:cNvSpPr>
+          <p:nvPr>
+            <p:ph sz="half" idx="1"/>
+          </p:nvPr>
+        </p:nvSpPr>
+        <p:spPr>
+          <a:xfrm>
+            <a:off x="609600" y="1200155"/>
+            <a:ext cx="2253916" cy="3394472"/>
+          </a:xfrm>
+        </p:spPr>
+        <p:txBody>
+          <a:bodyPr/>
+          <a:lstStyle/>
+          <a:p>
+            <a:pPr algn="ctr">
               <a:buNone/>
             </a:pPr>
             <a:r>
               <a:rPr lang="pl-PL" dirty="0" smtClean="0"/>
-              <a:t>	Projekt systemu opiera się na scentralizowanej relacyjnej bazy danych MySQL która zawiera całą logikę wraz z danymi. Baza danych została wyposażona w szereg interfejsów pod postacią: procedur, funkcji i widoków.</a:t>
-            </a:r>
-          </a:p>
-          <a:p>
-            <a:pPr marL="0" indent="0">
-              <a:buNone/>
-            </a:pPr>
-            <a:r>
-              <a:rPr lang="pl-PL" dirty="0"/>
-              <a:t>	</a:t>
-            </a:r>
-            <a:r>
-              <a:rPr lang="pl-PL" dirty="0" smtClean="0"/>
-              <a:t>Obok bazy danych, na tej samej maszynie fizycznej znajduje się WebService który został napisany w PHP 7 z zastosowaniem frameworku Symfony 4. </a:t>
-            </a:r>
-          </a:p>
-          <a:p>
-            <a:pPr marL="0" indent="0">
-              <a:buNone/>
-            </a:pPr>
-            <a:r>
-              <a:rPr lang="pl-PL" dirty="0"/>
-              <a:t>	</a:t>
-            </a:r>
-            <a:r>
-              <a:rPr lang="pl-PL" dirty="0" smtClean="0"/>
-              <a:t>Została użyta architektura klient-serwer. Wspomniana wyżej maszyna fizyczna to serwer natomiast klientem jest przeglądarka internetowa. </a:t>
-            </a:r>
-          </a:p>
-          <a:p>
-            <a:pPr marL="0" indent="0">
-              <a:buNone/>
-            </a:pPr>
-            <a:r>
-              <a:rPr lang="pl-PL" dirty="0" smtClean="0"/>
-              <a:t>	Od strony klienta działa strona internetowa napisana w HTML5 z użyciem JS i CSS3. </a:t>
+              <a:t>Widok lista rezerwacji wyświetla rezerwacje dokonane przez użytkowników, ofertę, okres najmu czy status płatności.</a:t>
             </a:r>
             <a:endParaRPr lang="pl-PL" dirty="0"/>
           </a:p>
         </p:txBody>
       </p:sp>
+      <p:pic>
+        <p:nvPicPr>
+          <p:cNvPr id="12290" name="Picture 2" descr="C:\Users\Janek\Desktop\Shoty\Screenshot_2019-01-13 Moje konto – Accommodation Announcements(10).png"/>
+          <p:cNvPicPr>
+            <a:picLocks noChangeAspect="1" noChangeArrowheads="1"/>
+          </p:cNvPicPr>
+          <p:nvPr/>
+        </p:nvPicPr>
+        <p:blipFill>
+          <a:blip r:embed="rId2"/>
+          <a:srcRect/>
+          <a:stretch>
+            <a:fillRect/>
+          </a:stretch>
+        </p:blipFill>
+        <p:spPr bwMode="auto">
+          <a:xfrm>
+            <a:off x="3820332" y="326661"/>
+            <a:ext cx="5155477" cy="4706465"/>
+          </a:xfrm>
+          <a:prstGeom prst="rect">
+            <a:avLst/>
+          </a:prstGeom>
+          <a:noFill/>
+        </p:spPr>
+      </p:pic>
     </p:spTree>
-    <p:extLst>
-      <p:ext uri="{BB962C8B-B14F-4D97-AF65-F5344CB8AC3E}">
-        <p14:creationId xmlns="" xmlns:p14="http://schemas.microsoft.com/office/powerpoint/2010/main" val="2219077538"/>
-      </p:ext>
-    </p:extLst>
   </p:cSld>
   <p:clrMapOvr>
     <a:masterClrMapping/>
   </p:clrMapOvr>
+  <p:timing>
+    <p:tnLst>
+      <p:par>
+        <p:cTn id="1" dur="indefinite" restart="never" nodeType="tmRoot"/>
+      </p:par>
+    </p:tnLst>
+  </p:timing>
 </p:sld>
 </file>
 
@@ -5134,113 +5347,91 @@
             </a:r>
             <a:r>
               <a:rPr lang="pl-PL" dirty="0"/>
-              <a:t>i użyte </a:t>
-            </a:r>
-            <a:r>
-              <a:rPr lang="pl-PL" dirty="0" smtClean="0"/>
-              <a:t>technologie c.d.</a:t>
+              <a:t>i użyte technologie</a:t>
+            </a:r>
+          </a:p>
+        </p:txBody>
+      </p:sp>
+      <p:sp>
+        <p:nvSpPr>
+          <p:cNvPr id="3" name="Content Placeholder 2"/>
+          <p:cNvSpPr>
+            <a:spLocks noGrp="1"/>
+          </p:cNvSpPr>
+          <p:nvPr>
+            <p:ph idx="1"/>
+          </p:nvPr>
+        </p:nvSpPr>
+        <p:spPr/>
+        <p:txBody>
+          <a:bodyPr>
+            <a:normAutofit fontScale="85000" lnSpcReduction="10000"/>
+          </a:bodyPr>
+          <a:lstStyle/>
+          <a:p>
+            <a:pPr marL="0" indent="0">
+              <a:buNone/>
+            </a:pPr>
+            <a:r>
+              <a:rPr lang="pl-PL" dirty="0" smtClean="0"/>
+              <a:t>	Projekt systemu opiera się na scentralizowanej relacyjnej bazy danych MySQL która zawiera całą logikę wraz z danymi. Baza danych została wyposażona w szereg interfejsów pod postacią: procedur, funkcji i widoków.</a:t>
+            </a:r>
+          </a:p>
+          <a:p>
+            <a:pPr marL="0" indent="0">
+              <a:buNone/>
+            </a:pPr>
+            <a:r>
+              <a:rPr lang="pl-PL" dirty="0"/>
+              <a:t>	</a:t>
+            </a:r>
+            <a:r>
+              <a:rPr lang="pl-PL" dirty="0" smtClean="0"/>
+              <a:t>Obok bazy danych, na tej samej maszynie fizycznej znajduje się WebService który został napisany w PHP 7 z zastosowaniem frameworku Symfony 4. </a:t>
+            </a:r>
+          </a:p>
+          <a:p>
+            <a:pPr marL="0" indent="0">
+              <a:buNone/>
+            </a:pPr>
+            <a:r>
+              <a:rPr lang="pl-PL" dirty="0"/>
+              <a:t>	</a:t>
+            </a:r>
+            <a:r>
+              <a:rPr lang="pl-PL" dirty="0" smtClean="0"/>
+              <a:t>Została użyta architektura klient-serwer. Wspomniana wyżej maszyna fizyczna to serwer natomiast klientem jest przeglądarka internetowa. </a:t>
+            </a:r>
+          </a:p>
+          <a:p>
+            <a:pPr marL="0" indent="0">
+              <a:buNone/>
+            </a:pPr>
+            <a:r>
+              <a:rPr lang="pl-PL" dirty="0" smtClean="0"/>
+              <a:t>	Od strony klienta działa strona internetowa napisana w HTML5 z użyciem JS i CSS3. </a:t>
             </a:r>
             <a:endParaRPr lang="pl-PL" dirty="0"/>
           </a:p>
         </p:txBody>
       </p:sp>
-      <p:sp>
-        <p:nvSpPr>
-          <p:cNvPr id="5" name="Symbol zastępczy zawartości 4"/>
-          <p:cNvSpPr>
-            <a:spLocks noGrp="1"/>
-          </p:cNvSpPr>
-          <p:nvPr>
-            <p:ph sz="half" idx="2"/>
-          </p:nvPr>
-        </p:nvSpPr>
-        <p:spPr>
-          <a:xfrm>
-            <a:off x="457200" y="1309607"/>
-            <a:ext cx="4040188" cy="3285015"/>
-          </a:xfrm>
-        </p:spPr>
-        <p:txBody>
-          <a:bodyPr/>
-          <a:lstStyle/>
-          <a:p>
-            <a:pPr>
-              <a:buNone/>
-            </a:pPr>
-            <a:r>
-              <a:rPr lang="pl-PL" dirty="0" smtClean="0"/>
-              <a:t>Diagram architektury systemu </a:t>
-            </a:r>
-            <a:endParaRPr lang="pl-PL" dirty="0"/>
-          </a:p>
-        </p:txBody>
-      </p:sp>
-      <p:pic>
-        <p:nvPicPr>
-          <p:cNvPr id="8" name="Picture 2"/>
-          <p:cNvPicPr>
-            <a:picLocks noGrp="1" noChangeAspect="1" noChangeArrowheads="1"/>
-          </p:cNvPicPr>
-          <p:nvPr>
-            <p:ph sz="quarter" idx="4"/>
-          </p:nvPr>
-        </p:nvPicPr>
-        <p:blipFill>
-          <a:blip r:embed="rId2">
-            <a:extLst>
-              <a:ext uri="{28A0092B-C50C-407E-A947-70E740481C1C}">
-                <a14:useLocalDpi xmlns="" xmlns:a14="http://schemas.microsoft.com/office/drawing/2010/main" val="0"/>
-              </a:ext>
-            </a:extLst>
-          </a:blip>
-          <a:srcRect/>
-          <a:stretch>
-            <a:fillRect/>
-          </a:stretch>
-        </p:blipFill>
-        <p:spPr bwMode="auto">
-          <a:xfrm>
-            <a:off x="4386022" y="1229378"/>
-            <a:ext cx="3660218" cy="3395843"/>
-          </a:xfrm>
-          <a:prstGeom prst="rect">
-            <a:avLst/>
-          </a:prstGeom>
-          <a:noFill/>
-          <a:ln>
-            <a:noFill/>
-          </a:ln>
-          <a:extLst>
-            <a:ext uri="{909E8E84-426E-40DD-AFC4-6F175D3DCCD1}">
-              <a14:hiddenFill xmlns="" xmlns:a14="http://schemas.microsoft.com/office/drawing/2010/main">
-                <a:solidFill>
-                  <a:srgbClr val="FFFFFF"/>
-                </a:solidFill>
-              </a14:hiddenFill>
-            </a:ext>
-            <a:ext uri="{91240B29-F687-4F45-9708-019B960494DF}">
-              <a14:hiddenLine xmlns="" xmlns:a14="http://schemas.microsoft.com/office/drawing/2010/main" w="9525">
-                <a:solidFill>
-                  <a:srgbClr val="000000"/>
-                </a:solidFill>
-                <a:miter lim="800000"/>
-                <a:headEnd/>
-                <a:tailEnd/>
-              </a14:hiddenLine>
-            </a:ext>
-          </a:extLst>
-        </p:spPr>
-      </p:pic>
     </p:spTree>
     <p:extLst>
       <p:ext uri="{BB962C8B-B14F-4D97-AF65-F5344CB8AC3E}">
-        <p14:creationId xmlns="" xmlns:p14="http://schemas.microsoft.com/office/powerpoint/2010/main" val="1554217288"/>
+        <p14:creationId xmlns:p14="http://schemas.microsoft.com/office/powerpoint/2010/main" xmlns="" val="2219077538"/>
       </p:ext>
     </p:extLst>
   </p:cSld>
   <p:clrMapOvr>
     <a:masterClrMapping/>
   </p:clrMapOvr>
+  <p:timing>
+    <p:tnLst>
+      <p:par>
+        <p:cTn id="1" dur="indefinite" restart="never" nodeType="tmRoot"/>
+      </p:par>
+    </p:tnLst>
+  </p:timing>
 </p:sld>
 </file>
 
@@ -5294,102 +5485,108 @@
       </p:sp>
       <p:sp>
         <p:nvSpPr>
-          <p:cNvPr id="3" name="Content Placeholder 2"/>
-          <p:cNvSpPr>
-            <a:spLocks noGrp="1"/>
-          </p:cNvSpPr>
-          <p:nvPr>
-            <p:ph idx="1"/>
-          </p:nvPr>
-        </p:nvSpPr>
-        <p:spPr/>
-        <p:txBody>
-          <a:bodyPr>
-            <a:normAutofit lnSpcReduction="10000"/>
-          </a:bodyPr>
-          <a:lstStyle/>
-          <a:p>
-            <a:pPr marL="0" indent="0">
+          <p:cNvPr id="5" name="Symbol zastępczy zawartości 4"/>
+          <p:cNvSpPr>
+            <a:spLocks noGrp="1"/>
+          </p:cNvSpPr>
+          <p:nvPr>
+            <p:ph sz="half" idx="2"/>
+          </p:nvPr>
+        </p:nvSpPr>
+        <p:spPr>
+          <a:xfrm>
+            <a:off x="185979" y="2665709"/>
+            <a:ext cx="4040188" cy="480447"/>
+          </a:xfrm>
+        </p:spPr>
+        <p:txBody>
+          <a:bodyPr/>
+          <a:lstStyle/>
+          <a:p>
+            <a:pPr algn="ctr">
               <a:buNone/>
             </a:pPr>
             <a:r>
               <a:rPr lang="pl-PL" dirty="0" smtClean="0"/>
-              <a:t>Plusy i minusy użytej architektury:</a:t>
-            </a:r>
-          </a:p>
-          <a:p>
-            <a:pPr marL="0" indent="0">
-              <a:buNone/>
-            </a:pPr>
-            <a:r>
-              <a:rPr lang="pl-PL" dirty="0" smtClean="0"/>
-              <a:t>Plusy:</a:t>
-            </a:r>
-          </a:p>
-          <a:p>
-            <a:r>
-              <a:rPr lang="pl-PL" dirty="0" smtClean="0"/>
-              <a:t>łatwy serwis, </a:t>
-            </a:r>
-          </a:p>
-          <a:p>
-            <a:r>
-              <a:rPr lang="pl-PL" dirty="0" smtClean="0"/>
-              <a:t>mały koszt budowy, </a:t>
-            </a:r>
-          </a:p>
-          <a:p>
-            <a:r>
-              <a:rPr lang="pl-PL" dirty="0" smtClean="0"/>
-              <a:t>łatwa migracja, </a:t>
-            </a:r>
-          </a:p>
-          <a:p>
-            <a:r>
-              <a:rPr lang="pl-PL" dirty="0" smtClean="0"/>
-              <a:t>szybka konfiguracja</a:t>
-            </a:r>
-          </a:p>
-          <a:p>
-            <a:pPr marL="0" indent="0">
-              <a:buNone/>
-            </a:pPr>
-            <a:r>
-              <a:rPr lang="pl-PL" dirty="0" smtClean="0"/>
-              <a:t>Minusy:</a:t>
-            </a:r>
-          </a:p>
-          <a:p>
-            <a:r>
-              <a:rPr lang="pl-PL" dirty="0" smtClean="0"/>
-              <a:t>uboga dokumentacja </a:t>
-            </a:r>
-            <a:r>
-              <a:rPr lang="pl-PL" dirty="0" err="1" smtClean="0"/>
-              <a:t>Symfony</a:t>
-            </a:r>
-            <a:r>
-              <a:rPr lang="pl-PL" dirty="0" smtClean="0"/>
-              <a:t> </a:t>
-            </a:r>
-            <a:r>
-              <a:rPr lang="pl-PL" dirty="0" err="1" smtClean="0"/>
-              <a:t>framework</a:t>
+              <a:t>Diagram architektury systemu </a:t>
             </a:r>
             <a:endParaRPr lang="pl-PL" dirty="0"/>
           </a:p>
         </p:txBody>
       </p:sp>
+      <p:pic>
+        <p:nvPicPr>
+          <p:cNvPr id="8" name="Picture 2"/>
+          <p:cNvPicPr>
+            <a:picLocks noGrp="1" noChangeAspect="1" noChangeArrowheads="1"/>
+          </p:cNvPicPr>
+          <p:nvPr>
+            <p:ph sz="quarter" idx="4"/>
+          </p:nvPr>
+        </p:nvPicPr>
+        <p:blipFill>
+          <a:blip r:embed="rId2">
+            <a:extLst>
+              <a:ext uri="{28A0092B-C50C-407E-A947-70E740481C1C}">
+                <a14:useLocalDpi xmlns:a14="http://schemas.microsoft.com/office/drawing/2010/main" xmlns="" val="0"/>
+              </a:ext>
+            </a:extLst>
+          </a:blip>
+          <a:srcRect/>
+          <a:stretch>
+            <a:fillRect/>
+          </a:stretch>
+        </p:blipFill>
+        <p:spPr bwMode="auto">
+          <a:xfrm>
+            <a:off x="4386022" y="1229378"/>
+            <a:ext cx="3660218" cy="3395843"/>
+          </a:xfrm>
+          <a:prstGeom prst="rect">
+            <a:avLst/>
+          </a:prstGeom>
+          <a:noFill/>
+          <a:ln>
+            <a:noFill/>
+          </a:ln>
+          <a:extLst>
+            <a:ext uri="{909E8E84-426E-40DD-AFC4-6F175D3DCCD1}">
+              <a14:hiddenFill xmlns:a14="http://schemas.microsoft.com/office/drawing/2010/main" xmlns="">
+                <a:solidFill>
+                  <a:srgbClr val="FFFFFF"/>
+                </a:solidFill>
+              </a14:hiddenFill>
+            </a:ext>
+            <a:ext uri="{91240B29-F687-4F45-9708-019B960494DF}">
+              <a14:hiddenLine xmlns:a14="http://schemas.microsoft.com/office/drawing/2010/main" xmlns="" w="9525">
+                <a:solidFill>
+                  <a:srgbClr val="000000"/>
+                </a:solidFill>
+                <a:miter lim="800000"/>
+                <a:headEnd/>
+                <a:tailEnd/>
+              </a14:hiddenLine>
+            </a:ext>
+          </a:extLst>
+        </p:spPr>
+      </p:pic>
     </p:spTree>
     <p:extLst>
       <p:ext uri="{BB962C8B-B14F-4D97-AF65-F5344CB8AC3E}">
-        <p14:creationId xmlns="" xmlns:p14="http://schemas.microsoft.com/office/powerpoint/2010/main" val="1581660104"/>
+        <p14:creationId xmlns:p14="http://schemas.microsoft.com/office/powerpoint/2010/main" xmlns="" val="1554217288"/>
       </p:ext>
     </p:extLst>
   </p:cSld>
   <p:clrMapOvr>
     <a:masterClrMapping/>
   </p:clrMapOvr>
+  <p:timing>
+    <p:tnLst>
+      <p:par>
+        <p:cTn id="1" dur="indefinite" restart="never" nodeType="tmRoot"/>
+      </p:par>
+    </p:tnLst>
+  </p:timing>
 </p:sld>
 </file>
 
@@ -5426,12 +5623,16 @@
           <a:lstStyle/>
           <a:p>
             <a:r>
+              <a:rPr lang="pl-PL" dirty="0" smtClean="0"/>
+              <a:t>Architektura </a:t>
+            </a:r>
+            <a:r>
               <a:rPr lang="pl-PL" dirty="0"/>
-              <a:t>Możliwości </a:t>
-            </a:r>
-            <a:r>
-              <a:rPr lang="pl-PL" dirty="0" smtClean="0"/>
-              <a:t>rozwoju</a:t>
+              <a:t>i użyte </a:t>
+            </a:r>
+            <a:r>
+              <a:rPr lang="pl-PL" dirty="0" smtClean="0"/>
+              <a:t>technologie c.d.</a:t>
             </a:r>
             <a:endParaRPr lang="pl-PL" dirty="0"/>
           </a:p>
@@ -5449,7 +5650,9 @@
         </p:nvSpPr>
         <p:spPr/>
         <p:txBody>
-          <a:bodyPr/>
+          <a:bodyPr>
+            <a:normAutofit lnSpcReduction="10000"/>
+          </a:bodyPr>
           <a:lstStyle/>
           <a:p>
             <a:pPr marL="0" indent="0">
@@ -5457,51 +5660,67 @@
             </a:pPr>
             <a:r>
               <a:rPr lang="pl-PL" dirty="0" smtClean="0"/>
-              <a:t>Architektura systemu pozwala na łatwe dodawanie nowych modułów. Przyszłości </a:t>
-            </a:r>
-            <a:r>
-              <a:rPr lang="pl-PL" dirty="0"/>
-              <a:t>można do implementować:</a:t>
-            </a:r>
-            <a:endParaRPr lang="pl-PL" dirty="0" smtClean="0"/>
-          </a:p>
-          <a:p>
-            <a:pPr marL="385763" indent="-385763">
-              <a:buAutoNum type="arabicPeriod"/>
+              <a:t>Plusy i minusy użytej architektury:</a:t>
+            </a:r>
+          </a:p>
+          <a:p>
+            <a:pPr marL="0" indent="0">
+              <a:buNone/>
             </a:pPr>
             <a:r>
               <a:rPr lang="pl-PL" dirty="0" smtClean="0"/>
-              <a:t>Procesy automatyczne które będą cyklicznie lub na żądanie wykonywać działania. </a:t>
-            </a:r>
-          </a:p>
-          <a:p>
-            <a:pPr marL="385763" indent="-385763">
-              <a:buAutoNum type="arabicPeriod"/>
+              <a:t>Plusy:</a:t>
+            </a:r>
+          </a:p>
+          <a:p>
+            <a:r>
+              <a:rPr lang="pl-PL" dirty="0" smtClean="0"/>
+              <a:t>łatwy serwis, </a:t>
+            </a:r>
+          </a:p>
+          <a:p>
+            <a:r>
+              <a:rPr lang="pl-PL" dirty="0" smtClean="0"/>
+              <a:t>mały koszt budowy, </a:t>
+            </a:r>
+          </a:p>
+          <a:p>
+            <a:r>
+              <a:rPr lang="pl-PL" dirty="0" smtClean="0"/>
+              <a:t>łatwa migracja, </a:t>
+            </a:r>
+          </a:p>
+          <a:p>
+            <a:r>
+              <a:rPr lang="pl-PL" dirty="0" smtClean="0"/>
+              <a:t>szybka konfiguracja</a:t>
+            </a:r>
+          </a:p>
+          <a:p>
+            <a:pPr marL="0" indent="0">
+              <a:buNone/>
             </a:pPr>
             <a:r>
               <a:rPr lang="pl-PL" dirty="0" smtClean="0"/>
-              <a:t>Kalendarz </a:t>
-            </a:r>
-            <a:r>
-              <a:rPr lang="pl-PL" dirty="0"/>
-              <a:t>w konkretnej ofercie informujący potencjalnego klienta o dostępności oferty</a:t>
-            </a:r>
-            <a:r>
-              <a:rPr lang="pl-PL" dirty="0" smtClean="0"/>
-              <a:t>.</a:t>
-            </a:r>
-          </a:p>
-          <a:p>
-            <a:pPr marL="385763" indent="-385763">
-              <a:buAutoNum type="arabicPeriod"/>
-            </a:pPr>
-            <a:r>
-              <a:rPr lang="pl-PL" dirty="0"/>
-              <a:t>Obsługa zewnętrznego serwisu </a:t>
-            </a:r>
-            <a:r>
-              <a:rPr lang="pl-PL" dirty="0" smtClean="0"/>
-              <a:t>do płatności on-line </a:t>
+              <a:t>Minusy:</a:t>
+            </a:r>
+          </a:p>
+          <a:p>
+            <a:r>
+              <a:rPr lang="pl-PL" dirty="0" smtClean="0"/>
+              <a:t>uboga dokumentacja </a:t>
+            </a:r>
+            <a:r>
+              <a:rPr lang="pl-PL" dirty="0" err="1" smtClean="0"/>
+              <a:t>Symfony</a:t>
+            </a:r>
+            <a:r>
+              <a:rPr lang="pl-PL" dirty="0" smtClean="0"/>
+              <a:t> </a:t>
+            </a:r>
+            <a:r>
+              <a:rPr lang="pl-PL" dirty="0" err="1" smtClean="0"/>
+              <a:t>framework</a:t>
             </a:r>
             <a:endParaRPr lang="pl-PL" dirty="0"/>
           </a:p>
@@ -5510,13 +5729,20 @@
     </p:spTree>
     <p:extLst>
       <p:ext uri="{BB962C8B-B14F-4D97-AF65-F5344CB8AC3E}">
-        <p14:creationId xmlns="" xmlns:p14="http://schemas.microsoft.com/office/powerpoint/2010/main" val="97012678"/>
+        <p14:creationId xmlns:p14="http://schemas.microsoft.com/office/powerpoint/2010/main" xmlns="" val="1581660104"/>
       </p:ext>
     </p:extLst>
   </p:cSld>
   <p:clrMapOvr>
     <a:masterClrMapping/>
   </p:clrMapOvr>
+  <p:timing>
+    <p:tnLst>
+      <p:par>
+        <p:cTn id="1" dur="indefinite" restart="never" nodeType="tmRoot"/>
+      </p:par>
+    </p:tnLst>
+  </p:timing>
 </p:sld>
 </file>
 
@@ -5539,12 +5765,12 @@
       </p:grpSpPr>
       <p:sp>
         <p:nvSpPr>
-          <p:cNvPr id="4" name="Title 3"/>
-          <p:cNvSpPr>
-            <a:spLocks noGrp="1"/>
-          </p:cNvSpPr>
-          <p:nvPr>
-            <p:ph type="ctrTitle"/>
+          <p:cNvPr id="2" name="Title 1"/>
+          <p:cNvSpPr>
+            <a:spLocks noGrp="1"/>
+          </p:cNvSpPr>
+          <p:nvPr>
+            <p:ph type="title"/>
           </p:nvPr>
         </p:nvSpPr>
         <p:spPr/>
@@ -5553,8 +5779,12 @@
           <a:lstStyle/>
           <a:p>
             <a:r>
-              <a:rPr lang="pl-PL" dirty="0" smtClean="0"/>
-              <a:t>Dziękujemy za uwagę.</a:t>
+              <a:rPr lang="pl-PL" dirty="0"/>
+              <a:t>Możliwości </a:t>
+            </a:r>
+            <a:r>
+              <a:rPr lang="pl-PL" dirty="0" smtClean="0"/>
+              <a:t>rozwoju</a:t>
             </a:r>
             <a:endParaRPr lang="pl-PL" dirty="0"/>
           </a:p>
@@ -5562,39 +5792,70 @@
       </p:sp>
       <p:sp>
         <p:nvSpPr>
-          <p:cNvPr id="5" name="Subtitle 4"/>
-          <p:cNvSpPr>
-            <a:spLocks noGrp="1"/>
-          </p:cNvSpPr>
-          <p:nvPr>
-            <p:ph type="subTitle" idx="1"/>
-          </p:nvPr>
-        </p:nvSpPr>
-        <p:spPr>
-          <a:xfrm>
-            <a:off x="1394848" y="2426453"/>
-            <a:ext cx="6400800" cy="1314450"/>
-          </a:xfrm>
-        </p:spPr>
-        <p:txBody>
-          <a:bodyPr>
-            <a:normAutofit/>
-          </a:bodyPr>
-          <a:lstStyle/>
-          <a:p>
+          <p:cNvPr id="3" name="Content Placeholder 2"/>
+          <p:cNvSpPr>
+            <a:spLocks noGrp="1"/>
+          </p:cNvSpPr>
+          <p:nvPr>
+            <p:ph idx="1"/>
+          </p:nvPr>
+        </p:nvSpPr>
+        <p:spPr/>
+        <p:txBody>
+          <a:bodyPr/>
+          <a:lstStyle/>
+          <a:p>
+            <a:pPr marL="0" indent="0">
+              <a:buNone/>
+            </a:pPr>
+            <a:r>
+              <a:rPr lang="pl-PL" dirty="0" smtClean="0"/>
+              <a:t>Architektura systemu pozwala na łatwe dodawanie nowych modułów. Przyszłości </a:t>
+            </a:r>
+            <a:r>
+              <a:rPr lang="pl-PL" dirty="0"/>
+              <a:t>można do implementować:</a:t>
+            </a:r>
             <a:endParaRPr lang="pl-PL" dirty="0" smtClean="0"/>
           </a:p>
           <a:p>
-            <a:r>
-              <a:rPr lang="pl-PL" sz="1400" dirty="0" smtClean="0"/>
-              <a:t>Czy </a:t>
-            </a:r>
-            <a:r>
-              <a:rPr lang="pl-PL" sz="1400" dirty="0" smtClean="0"/>
-              <a:t>mają Państwo pytania?</a:t>
-            </a:r>
-          </a:p>
-          <a:p>
+            <a:pPr marL="385763" indent="-385763">
+              <a:buAutoNum type="arabicPeriod"/>
+            </a:pPr>
+            <a:r>
+              <a:rPr lang="pl-PL" dirty="0" smtClean="0"/>
+              <a:t>Procesy automatyczne które będą cyklicznie lub na żądanie wykonywać działania. </a:t>
+            </a:r>
+          </a:p>
+          <a:p>
+            <a:pPr marL="385763" indent="-385763">
+              <a:buAutoNum type="arabicPeriod"/>
+            </a:pPr>
+            <a:r>
+              <a:rPr lang="pl-PL" dirty="0" smtClean="0"/>
+              <a:t>Kalendarz </a:t>
+            </a:r>
+            <a:r>
+              <a:rPr lang="pl-PL" dirty="0"/>
+              <a:t>w konkretnej ofercie informujący potencjalnego klienta o dostępności oferty</a:t>
+            </a:r>
+            <a:r>
+              <a:rPr lang="pl-PL" dirty="0" smtClean="0"/>
+              <a:t>.</a:t>
+            </a:r>
+          </a:p>
+          <a:p>
+            <a:pPr marL="385763" indent="-385763">
+              <a:buAutoNum type="arabicPeriod"/>
+            </a:pPr>
+            <a:r>
+              <a:rPr lang="pl-PL" dirty="0"/>
+              <a:t>Obsługa zewnętrznego serwisu </a:t>
+            </a:r>
+            <a:r>
+              <a:rPr lang="pl-PL" dirty="0" smtClean="0"/>
+              <a:t>do płatności on-line </a:t>
+            </a:r>
             <a:endParaRPr lang="pl-PL" dirty="0"/>
           </a:p>
         </p:txBody>
@@ -5602,13 +5863,20 @@
     </p:spTree>
     <p:extLst>
       <p:ext uri="{BB962C8B-B14F-4D97-AF65-F5344CB8AC3E}">
-        <p14:creationId xmlns="" xmlns:p14="http://schemas.microsoft.com/office/powerpoint/2010/main" val="1741086671"/>
+        <p14:creationId xmlns:p14="http://schemas.microsoft.com/office/powerpoint/2010/main" xmlns="" val="97012678"/>
       </p:ext>
     </p:extLst>
   </p:cSld>
   <p:clrMapOvr>
     <a:masterClrMapping/>
   </p:clrMapOvr>
+  <p:timing>
+    <p:tnLst>
+      <p:par>
+        <p:cTn id="1" dur="indefinite" restart="never" nodeType="tmRoot"/>
+      </p:par>
+    </p:tnLst>
+  </p:timing>
 </p:sld>
 </file>
 
@@ -5674,11 +5942,7 @@
             </a:pPr>
             <a:r>
               <a:rPr lang="pl-PL" dirty="0" smtClean="0"/>
-              <a:t>	</a:t>
-            </a:r>
-            <a:r>
-              <a:rPr lang="pl-PL" dirty="0" smtClean="0"/>
-              <a:t>Projekt ma na celu stworzenie aplikacji - Elektronicznego Systemu Rezerwacji Apartamentów. 	</a:t>
+              <a:t>	Projekt ma na celu stworzenie aplikacji - Elektronicznego Systemu Rezerwacji Apartamentów. 	</a:t>
             </a:r>
           </a:p>
           <a:p>
@@ -5705,13 +5969,115 @@
     </p:spTree>
     <p:extLst>
       <p:ext uri="{BB962C8B-B14F-4D97-AF65-F5344CB8AC3E}">
-        <p14:creationId xmlns="" xmlns:p14="http://schemas.microsoft.com/office/powerpoint/2010/main" val="1807531547"/>
+        <p14:creationId xmlns:p14="http://schemas.microsoft.com/office/powerpoint/2010/main" xmlns="" val="1807531547"/>
       </p:ext>
     </p:extLst>
   </p:cSld>
   <p:clrMapOvr>
     <a:masterClrMapping/>
   </p:clrMapOvr>
+  <p:timing>
+    <p:tnLst>
+      <p:par>
+        <p:cTn id="1" dur="indefinite" restart="never" nodeType="tmRoot"/>
+      </p:par>
+    </p:tnLst>
+  </p:timing>
+</p:sld>
+</file>
+
+<file path=ppt/slides/slide30.xml><?xml version="1.0" encoding="utf-8"?>
+<p:sld xmlns:a="http://schemas.openxmlformats.org/drawingml/2006/main" xmlns:r="http://schemas.openxmlformats.org/officeDocument/2006/relationships" xmlns:p="http://schemas.openxmlformats.org/presentationml/2006/main">
+  <p:cSld>
+    <p:spTree>
+      <p:nvGrpSpPr>
+        <p:cNvPr id="1" name=""/>
+        <p:cNvGrpSpPr/>
+        <p:nvPr/>
+      </p:nvGrpSpPr>
+      <p:grpSpPr>
+        <a:xfrm>
+          <a:off x="0" y="0"/>
+          <a:ext cx="0" cy="0"/>
+          <a:chOff x="0" y="0"/>
+          <a:chExt cx="0" cy="0"/>
+        </a:xfrm>
+      </p:grpSpPr>
+      <p:sp>
+        <p:nvSpPr>
+          <p:cNvPr id="4" name="Title 3"/>
+          <p:cNvSpPr>
+            <a:spLocks noGrp="1"/>
+          </p:cNvSpPr>
+          <p:nvPr>
+            <p:ph type="ctrTitle"/>
+          </p:nvPr>
+        </p:nvSpPr>
+        <p:spPr/>
+        <p:txBody>
+          <a:bodyPr/>
+          <a:lstStyle/>
+          <a:p>
+            <a:r>
+              <a:rPr lang="pl-PL" dirty="0" smtClean="0"/>
+              <a:t>Dziękujemy za uwagę.</a:t>
+            </a:r>
+            <a:endParaRPr lang="pl-PL" dirty="0"/>
+          </a:p>
+        </p:txBody>
+      </p:sp>
+      <p:sp>
+        <p:nvSpPr>
+          <p:cNvPr id="5" name="Subtitle 4"/>
+          <p:cNvSpPr>
+            <a:spLocks noGrp="1"/>
+          </p:cNvSpPr>
+          <p:nvPr>
+            <p:ph type="subTitle" idx="1"/>
+          </p:nvPr>
+        </p:nvSpPr>
+        <p:spPr>
+          <a:xfrm>
+            <a:off x="1394848" y="2426453"/>
+            <a:ext cx="6400800" cy="1314450"/>
+          </a:xfrm>
+        </p:spPr>
+        <p:txBody>
+          <a:bodyPr>
+            <a:normAutofit/>
+          </a:bodyPr>
+          <a:lstStyle/>
+          <a:p>
+            <a:endParaRPr lang="pl-PL" dirty="0" smtClean="0"/>
+          </a:p>
+          <a:p>
+            <a:r>
+              <a:rPr lang="pl-PL" sz="1400" dirty="0" smtClean="0"/>
+              <a:t>Czy mają Państwo pytania?</a:t>
+            </a:r>
+          </a:p>
+          <a:p>
+            <a:endParaRPr lang="pl-PL" dirty="0"/>
+          </a:p>
+        </p:txBody>
+      </p:sp>
+    </p:spTree>
+    <p:extLst>
+      <p:ext uri="{BB962C8B-B14F-4D97-AF65-F5344CB8AC3E}">
+        <p14:creationId xmlns:p14="http://schemas.microsoft.com/office/powerpoint/2010/main" xmlns="" val="1741086671"/>
+      </p:ext>
+    </p:extLst>
+  </p:cSld>
+  <p:clrMapOvr>
+    <a:masterClrMapping/>
+  </p:clrMapOvr>
+  <p:timing>
+    <p:tnLst>
+      <p:par>
+        <p:cTn id="1" dur="indefinite" restart="never" nodeType="tmRoot"/>
+      </p:par>
+    </p:tnLst>
+  </p:timing>
 </p:sld>
 </file>
 
@@ -5749,7 +6115,15 @@
           <a:p>
             <a:r>
               <a:rPr lang="pl-PL" dirty="0"/>
-              <a:t>Profil potencialnego klienta serwisu</a:t>
+              <a:t>Profil </a:t>
+            </a:r>
+            <a:r>
+              <a:rPr lang="pl-PL" dirty="0" smtClean="0"/>
+              <a:t>potencjalnego </a:t>
+            </a:r>
+            <a:r>
+              <a:rPr lang="pl-PL" dirty="0"/>
+              <a:t>klienta serwisu</a:t>
             </a:r>
           </a:p>
         </p:txBody>
@@ -5804,13 +6178,20 @@
     </p:spTree>
     <p:extLst>
       <p:ext uri="{BB962C8B-B14F-4D97-AF65-F5344CB8AC3E}">
-        <p14:creationId xmlns="" xmlns:p14="http://schemas.microsoft.com/office/powerpoint/2010/main" val="178176783"/>
+        <p14:creationId xmlns:p14="http://schemas.microsoft.com/office/powerpoint/2010/main" xmlns="" val="178176783"/>
       </p:ext>
     </p:extLst>
   </p:cSld>
   <p:clrMapOvr>
     <a:masterClrMapping/>
   </p:clrMapOvr>
+  <p:timing>
+    <p:tnLst>
+      <p:par>
+        <p:cTn id="1" dur="indefinite" restart="never" nodeType="tmRoot"/>
+      </p:par>
+    </p:tnLst>
+  </p:timing>
 </p:sld>
 </file>
 
@@ -5952,13 +6333,20 @@
     </p:spTree>
     <p:extLst>
       <p:ext uri="{BB962C8B-B14F-4D97-AF65-F5344CB8AC3E}">
-        <p14:creationId xmlns="" xmlns:p14="http://schemas.microsoft.com/office/powerpoint/2010/main" val="2433895241"/>
+        <p14:creationId xmlns:p14="http://schemas.microsoft.com/office/powerpoint/2010/main" xmlns="" val="2433895241"/>
       </p:ext>
     </p:extLst>
   </p:cSld>
   <p:clrMapOvr>
     <a:masterClrMapping/>
   </p:clrMapOvr>
+  <p:timing>
+    <p:tnLst>
+      <p:par>
+        <p:cTn id="1" dur="indefinite" restart="never" nodeType="tmRoot"/>
+      </p:par>
+    </p:tnLst>
+  </p:timing>
 </p:sld>
 </file>
 
@@ -6082,6 +6470,13 @@
   <p:clrMapOvr>
     <a:masterClrMapping/>
   </p:clrMapOvr>
+  <p:timing>
+    <p:tnLst>
+      <p:par>
+        <p:cTn id="1" dur="indefinite" restart="never" nodeType="tmRoot"/>
+      </p:par>
+    </p:tnLst>
+  </p:timing>
 </p:sld>
 </file>
 
@@ -6196,6 +6591,13 @@
   <p:clrMapOvr>
     <a:masterClrMapping/>
   </p:clrMapOvr>
+  <p:timing>
+    <p:tnLst>
+      <p:par>
+        <p:cTn id="1" dur="indefinite" restart="never" nodeType="tmRoot"/>
+      </p:par>
+    </p:tnLst>
+  </p:timing>
 </p:sld>
 </file>
 
@@ -6312,6 +6714,13 @@
   <p:clrMapOvr>
     <a:masterClrMapping/>
   </p:clrMapOvr>
+  <p:timing>
+    <p:tnLst>
+      <p:par>
+        <p:cTn id="1" dur="indefinite" restart="never" nodeType="tmRoot"/>
+      </p:par>
+    </p:tnLst>
+  </p:timing>
 </p:sld>
 </file>
 
@@ -6384,11 +6793,7 @@
             </a:pPr>
             <a:r>
               <a:rPr lang="pl-PL" dirty="0" smtClean="0"/>
-              <a:t>Widok dodania nowej oferty do systemu. Użytkownik po zalogowaniu się uzyskuje możliwość dodania oferty. Poprzez </a:t>
-            </a:r>
-            <a:r>
-              <a:rPr lang="pl-PL" dirty="0" smtClean="0"/>
-              <a:t>naciśnięcie </a:t>
+              <a:t>Widok dodania nowej oferty do systemu. Użytkownik po zalogowaniu się uzyskuje możliwość dodania oferty. Poprzez naciśnięcie </a:t>
             </a:r>
             <a:r>
               <a:rPr lang="pl-PL" dirty="0" err="1" smtClean="0"/>
@@ -6442,6 +6847,13 @@
   <p:clrMapOvr>
     <a:masterClrMapping/>
   </p:clrMapOvr>
+  <p:timing>
+    <p:tnLst>
+      <p:par>
+        <p:cTn id="1" dur="indefinite" restart="never" nodeType="tmRoot"/>
+      </p:par>
+    </p:tnLst>
+  </p:timing>
 </p:sld>
 </file>
 

</xml_diff>

<commit_message>
Korekta layoutu głównego prezentacji
</commit_message>
<xml_diff>
--- a/accommodation_announcements_presentation.pptx
+++ b/accommodation_announcements_presentation.pptx
@@ -135,7 +135,7 @@
   </p:defaultTextStyle>
   <p:extLst>
     <p:ext uri="{EFAFB233-063F-42B5-8137-9DF3F51BA10A}">
-      <p15:sldGuideLst xmlns:p15="http://schemas.microsoft.com/office/powerpoint/2012/main" xmlns=""/>
+      <p15:sldGuideLst xmlns="" xmlns:p15="http://schemas.microsoft.com/office/powerpoint/2012/main"/>
     </p:ext>
   </p:extLst>
 </p:presentation>
@@ -3125,7 +3125,7 @@
     </p:spTree>
     <p:extLst>
       <p:ext uri="{BB962C8B-B14F-4D97-AF65-F5344CB8AC3E}">
-        <p14:creationId xmlns:p14="http://schemas.microsoft.com/office/powerpoint/2010/main" xmlns="" val="3501191804"/>
+        <p14:creationId xmlns="" xmlns:p14="http://schemas.microsoft.com/office/powerpoint/2010/main" val="3501191804"/>
       </p:ext>
     </p:extLst>
   </p:cSld>
@@ -3481,11 +3481,7 @@
             </a:pPr>
             <a:r>
               <a:rPr lang="pl-PL" dirty="0" smtClean="0"/>
-              <a:t>Szczegóły konta – </a:t>
-            </a:r>
-            <a:r>
-              <a:rPr lang="pl-PL" dirty="0" smtClean="0"/>
-              <a:t>widok użytkownika</a:t>
+              <a:t>Szczegóły konta – widok użytkownika</a:t>
             </a:r>
           </a:p>
           <a:p>
@@ -3512,15 +3508,7 @@
             </a:pPr>
             <a:r>
               <a:rPr lang="pl-PL" dirty="0" smtClean="0"/>
-              <a:t>Szczegóły konta</a:t>
-            </a:r>
-            <a:r>
-              <a:rPr lang="pl-PL" dirty="0" smtClean="0"/>
-              <a:t> </a:t>
-            </a:r>
-            <a:r>
-              <a:rPr lang="pl-PL" dirty="0" smtClean="0"/>
-              <a:t>– administrator systemu</a:t>
+              <a:t>Szczegóły konta – administrator systemu</a:t>
             </a:r>
           </a:p>
           <a:p>
@@ -3574,11 +3562,7 @@
             </a:pPr>
             <a:r>
               <a:rPr lang="pl-PL" dirty="0" smtClean="0"/>
-              <a:t>	</a:t>
-            </a:r>
-            <a:r>
-              <a:rPr lang="pl-PL" dirty="0" smtClean="0"/>
-              <a:t>Rezerwacje</a:t>
+              <a:t>	Rezerwacje</a:t>
             </a:r>
             <a:endParaRPr lang="pl-PL" dirty="0"/>
           </a:p>
@@ -3995,15 +3979,7 @@
           <a:p>
             <a:r>
               <a:rPr lang="pl-PL" sz="2400" dirty="0" smtClean="0"/>
-              <a:t>Szczegóły konta</a:t>
-            </a:r>
-            <a:r>
-              <a:rPr lang="pl-PL" sz="2400" dirty="0" smtClean="0"/>
-              <a:t> </a:t>
-            </a:r>
-            <a:r>
-              <a:rPr lang="pl-PL" sz="2400" dirty="0" smtClean="0"/>
-              <a:t>- </a:t>
+              <a:t>Szczegóły konta - </a:t>
             </a:r>
             <a:r>
               <a:rPr lang="pl-PL" sz="2400" dirty="0" err="1" smtClean="0"/>
@@ -4393,23 +4369,7 @@
             </a:pPr>
             <a:r>
               <a:rPr lang="pl-PL" dirty="0" smtClean="0"/>
-              <a:t>Widok Szczegóły </a:t>
-            </a:r>
-            <a:r>
-              <a:rPr lang="pl-PL" dirty="0" smtClean="0"/>
-              <a:t>konta dla konta administratora. Administrator </a:t>
-            </a:r>
-            <a:r>
-              <a:rPr lang="pl-PL" dirty="0" smtClean="0"/>
-              <a:t>ma wgląd </a:t>
-            </a:r>
-            <a:r>
-              <a:rPr lang="pl-PL" dirty="0" smtClean="0"/>
-              <a:t>do </a:t>
-            </a:r>
-            <a:r>
-              <a:rPr lang="pl-PL" dirty="0" smtClean="0"/>
-              <a:t>danych, możliwość ich edycji i zmiany hasła. </a:t>
+              <a:t>Widok Szczegóły konta dla konta administratora. Administrator ma wgląd do danych, możliwość ich edycji i zmiany hasła. </a:t>
             </a:r>
           </a:p>
           <a:p>
@@ -4574,7 +4534,7 @@
     </p:spTree>
     <p:extLst>
       <p:ext uri="{BB962C8B-B14F-4D97-AF65-F5344CB8AC3E}">
-        <p14:creationId xmlns:p14="http://schemas.microsoft.com/office/powerpoint/2010/main" xmlns="" val="863505633"/>
+        <p14:creationId xmlns="" xmlns:p14="http://schemas.microsoft.com/office/powerpoint/2010/main" val="863505633"/>
       </p:ext>
     </p:extLst>
   </p:cSld>
@@ -5418,7 +5378,7 @@
     </p:spTree>
     <p:extLst>
       <p:ext uri="{BB962C8B-B14F-4D97-AF65-F5344CB8AC3E}">
-        <p14:creationId xmlns:p14="http://schemas.microsoft.com/office/powerpoint/2010/main" xmlns="" val="2219077538"/>
+        <p14:creationId xmlns="" xmlns:p14="http://schemas.microsoft.com/office/powerpoint/2010/main" val="2219077538"/>
       </p:ext>
     </p:extLst>
   </p:cSld>
@@ -5528,7 +5488,7 @@
           <a:blip r:embed="rId2">
             <a:extLst>
               <a:ext uri="{28A0092B-C50C-407E-A947-70E740481C1C}">
-                <a14:useLocalDpi xmlns:a14="http://schemas.microsoft.com/office/drawing/2010/main" xmlns="" val="0"/>
+                <a14:useLocalDpi xmlns="" xmlns:a14="http://schemas.microsoft.com/office/drawing/2010/main" val="0"/>
               </a:ext>
             </a:extLst>
           </a:blip>
@@ -5551,14 +5511,14 @@
           </a:ln>
           <a:extLst>
             <a:ext uri="{909E8E84-426E-40DD-AFC4-6F175D3DCCD1}">
-              <a14:hiddenFill xmlns:a14="http://schemas.microsoft.com/office/drawing/2010/main" xmlns="">
+              <a14:hiddenFill xmlns="" xmlns:a14="http://schemas.microsoft.com/office/drawing/2010/main">
                 <a:solidFill>
                   <a:srgbClr val="FFFFFF"/>
                 </a:solidFill>
               </a14:hiddenFill>
             </a:ext>
             <a:ext uri="{91240B29-F687-4F45-9708-019B960494DF}">
-              <a14:hiddenLine xmlns:a14="http://schemas.microsoft.com/office/drawing/2010/main" xmlns="" w="9525">
+              <a14:hiddenLine xmlns="" xmlns:a14="http://schemas.microsoft.com/office/drawing/2010/main" w="9525">
                 <a:solidFill>
                   <a:srgbClr val="000000"/>
                 </a:solidFill>
@@ -5573,7 +5533,7 @@
     </p:spTree>
     <p:extLst>
       <p:ext uri="{BB962C8B-B14F-4D97-AF65-F5344CB8AC3E}">
-        <p14:creationId xmlns:p14="http://schemas.microsoft.com/office/powerpoint/2010/main" xmlns="" val="1554217288"/>
+        <p14:creationId xmlns="" xmlns:p14="http://schemas.microsoft.com/office/powerpoint/2010/main" val="1554217288"/>
       </p:ext>
     </p:extLst>
   </p:cSld>
@@ -5729,7 +5689,7 @@
     </p:spTree>
     <p:extLst>
       <p:ext uri="{BB962C8B-B14F-4D97-AF65-F5344CB8AC3E}">
-        <p14:creationId xmlns:p14="http://schemas.microsoft.com/office/powerpoint/2010/main" xmlns="" val="1581660104"/>
+        <p14:creationId xmlns="" xmlns:p14="http://schemas.microsoft.com/office/powerpoint/2010/main" val="1581660104"/>
       </p:ext>
     </p:extLst>
   </p:cSld>
@@ -5863,7 +5823,7 @@
     </p:spTree>
     <p:extLst>
       <p:ext uri="{BB962C8B-B14F-4D97-AF65-F5344CB8AC3E}">
-        <p14:creationId xmlns:p14="http://schemas.microsoft.com/office/powerpoint/2010/main" xmlns="" val="97012678"/>
+        <p14:creationId xmlns="" xmlns:p14="http://schemas.microsoft.com/office/powerpoint/2010/main" val="97012678"/>
       </p:ext>
     </p:extLst>
   </p:cSld>
@@ -5969,7 +5929,7 @@
     </p:spTree>
     <p:extLst>
       <p:ext uri="{BB962C8B-B14F-4D97-AF65-F5344CB8AC3E}">
-        <p14:creationId xmlns:p14="http://schemas.microsoft.com/office/powerpoint/2010/main" xmlns="" val="1807531547"/>
+        <p14:creationId xmlns="" xmlns:p14="http://schemas.microsoft.com/office/powerpoint/2010/main" val="1807531547"/>
       </p:ext>
     </p:extLst>
   </p:cSld>
@@ -6064,7 +6024,7 @@
     </p:spTree>
     <p:extLst>
       <p:ext uri="{BB962C8B-B14F-4D97-AF65-F5344CB8AC3E}">
-        <p14:creationId xmlns:p14="http://schemas.microsoft.com/office/powerpoint/2010/main" xmlns="" val="1741086671"/>
+        <p14:creationId xmlns="" xmlns:p14="http://schemas.microsoft.com/office/powerpoint/2010/main" val="1741086671"/>
       </p:ext>
     </p:extLst>
   </p:cSld>
@@ -6178,7 +6138,7 @@
     </p:spTree>
     <p:extLst>
       <p:ext uri="{BB962C8B-B14F-4D97-AF65-F5344CB8AC3E}">
-        <p14:creationId xmlns:p14="http://schemas.microsoft.com/office/powerpoint/2010/main" xmlns="" val="178176783"/>
+        <p14:creationId xmlns="" xmlns:p14="http://schemas.microsoft.com/office/powerpoint/2010/main" val="178176783"/>
       </p:ext>
     </p:extLst>
   </p:cSld>
@@ -6333,7 +6293,7 @@
     </p:spTree>
     <p:extLst>
       <p:ext uri="{BB962C8B-B14F-4D97-AF65-F5344CB8AC3E}">
-        <p14:creationId xmlns:p14="http://schemas.microsoft.com/office/powerpoint/2010/main" xmlns="" val="2433895241"/>
+        <p14:creationId xmlns="" xmlns:p14="http://schemas.microsoft.com/office/powerpoint/2010/main" val="2433895241"/>
       </p:ext>
     </p:extLst>
   </p:cSld>

</xml_diff>